<commit_message>
Updated 3/29 Powerpoint and R file
Updated 3/29
</commit_message>
<xml_diff>
--- a/Final Project Presentation_Data Science 04032020.pptx
+++ b/Final Project Presentation_Data Science 04032020.pptx
@@ -5,7 +5,7 @@
     <p:sldMasterId id="2147483705" r:id="rId1"/>
   </p:sldMasterIdLst>
   <p:notesMasterIdLst>
-    <p:notesMasterId r:id="rId16"/>
+    <p:notesMasterId r:id="rId17"/>
   </p:notesMasterIdLst>
   <p:sldIdLst>
     <p:sldId id="256" r:id="rId2"/>
@@ -22,6 +22,7 @@
     <p:sldId id="275" r:id="rId13"/>
     <p:sldId id="267" r:id="rId14"/>
     <p:sldId id="268" r:id="rId15"/>
+    <p:sldId id="280" r:id="rId16"/>
   </p:sldIdLst>
   <p:sldSz cx="9144000" cy="6858000" type="screen4x3"/>
   <p:notesSz cx="6858000" cy="9144000"/>
@@ -126,6 +127,578 @@
     </p:ext>
   </p:extLst>
 </p:presentation>
+</file>
+
+<file path=ppt/revisionInfo.xml><?xml version="1.0" encoding="utf-8"?>
+<p1510:revInfo xmlns:a="http://schemas.openxmlformats.org/drawingml/2006/main" xmlns:r="http://schemas.openxmlformats.org/officeDocument/2006/relationships" xmlns:p1510="http://schemas.microsoft.com/office/powerpoint/2015/10/main">
+  <p1510:revLst>
+    <p1510:client id="{6C3BA105-2B27-48A9-B6B4-03BC62812DFC}" v="8" dt="2020-03-29T19:07:43.976"/>
+  </p1510:revLst>
+</p1510:revInfo>
+</file>
+
+<file path=ppt/changesInfos/changesInfo1.xml><?xml version="1.0" encoding="utf-8"?>
+<pc:chgInfo xmlns:a="http://schemas.openxmlformats.org/drawingml/2006/main" xmlns:r="http://schemas.openxmlformats.org/officeDocument/2006/relationships" xmlns:ac="http://schemas.microsoft.com/office/drawing/2013/main/command" xmlns:pc="http://schemas.microsoft.com/office/powerpoint/2013/main/command">
+  <pc:docChgLst>
+    <pc:chgData name="Kandis Lamke" userId="9cb7febe679b7ad2" providerId="LiveId" clId="{6C3BA105-2B27-48A9-B6B4-03BC62812DFC}"/>
+    <pc:docChg chg="undo custSel mod addSld delSld modSld addSection delSection">
+      <pc:chgData name="Kandis Lamke" userId="9cb7febe679b7ad2" providerId="LiveId" clId="{6C3BA105-2B27-48A9-B6B4-03BC62812DFC}" dt="2020-03-29T22:58:38.763" v="742" actId="20577"/>
+      <pc:docMkLst>
+        <pc:docMk/>
+      </pc:docMkLst>
+      <pc:sldChg chg="modSp mod">
+        <pc:chgData name="Kandis Lamke" userId="9cb7febe679b7ad2" providerId="LiveId" clId="{6C3BA105-2B27-48A9-B6B4-03BC62812DFC}" dt="2020-03-28T19:58:20.976" v="198" actId="20577"/>
+        <pc:sldMkLst>
+          <pc:docMk/>
+          <pc:sldMk cId="710178265" sldId="256"/>
+        </pc:sldMkLst>
+        <pc:spChg chg="mod">
+          <ac:chgData name="Kandis Lamke" userId="9cb7febe679b7ad2" providerId="LiveId" clId="{6C3BA105-2B27-48A9-B6B4-03BC62812DFC}" dt="2020-03-28T19:58:20.976" v="198" actId="20577"/>
+          <ac:spMkLst>
+            <pc:docMk/>
+            <pc:sldMk cId="710178265" sldId="256"/>
+            <ac:spMk id="3" creationId="{00000000-0000-0000-0000-000000000000}"/>
+          </ac:spMkLst>
+        </pc:spChg>
+      </pc:sldChg>
+      <pc:sldChg chg="addSp delSp modSp mod setBg setClrOvrMap">
+        <pc:chgData name="Kandis Lamke" userId="9cb7febe679b7ad2" providerId="LiveId" clId="{6C3BA105-2B27-48A9-B6B4-03BC62812DFC}" dt="2020-03-28T19:47:17.904" v="39" actId="1076"/>
+        <pc:sldMkLst>
+          <pc:docMk/>
+          <pc:sldMk cId="1954549449" sldId="264"/>
+        </pc:sldMkLst>
+        <pc:spChg chg="mod">
+          <ac:chgData name="Kandis Lamke" userId="9cb7febe679b7ad2" providerId="LiveId" clId="{6C3BA105-2B27-48A9-B6B4-03BC62812DFC}" dt="2020-03-28T19:47:17.904" v="39" actId="1076"/>
+          <ac:spMkLst>
+            <pc:docMk/>
+            <pc:sldMk cId="1954549449" sldId="264"/>
+            <ac:spMk id="3" creationId="{00000000-0000-0000-0000-000000000000}"/>
+          </ac:spMkLst>
+        </pc:spChg>
+        <pc:spChg chg="add del mod">
+          <ac:chgData name="Kandis Lamke" userId="9cb7febe679b7ad2" providerId="LiveId" clId="{6C3BA105-2B27-48A9-B6B4-03BC62812DFC}" dt="2020-03-28T19:45:18.947" v="1"/>
+          <ac:spMkLst>
+            <pc:docMk/>
+            <pc:sldMk cId="1954549449" sldId="264"/>
+            <ac:spMk id="4" creationId="{88E07059-A474-493E-B7C8-70ACB804029F}"/>
+          </ac:spMkLst>
+        </pc:spChg>
+        <pc:spChg chg="add del mod">
+          <ac:chgData name="Kandis Lamke" userId="9cb7febe679b7ad2" providerId="LiveId" clId="{6C3BA105-2B27-48A9-B6B4-03BC62812DFC}" dt="2020-03-28T19:45:18.947" v="1"/>
+          <ac:spMkLst>
+            <pc:docMk/>
+            <pc:sldMk cId="1954549449" sldId="264"/>
+            <ac:spMk id="5" creationId="{FB982754-F73C-40B3-B15E-20AF47D1580B}"/>
+          </ac:spMkLst>
+        </pc:spChg>
+        <pc:spChg chg="add del">
+          <ac:chgData name="Kandis Lamke" userId="9cb7febe679b7ad2" providerId="LiveId" clId="{6C3BA105-2B27-48A9-B6B4-03BC62812DFC}" dt="2020-03-28T19:45:49.691" v="3" actId="26606"/>
+          <ac:spMkLst>
+            <pc:docMk/>
+            <pc:sldMk cId="1954549449" sldId="264"/>
+            <ac:spMk id="10" creationId="{DF43132E-D4DF-4A83-9344-A782D0F5D9F6}"/>
+          </ac:spMkLst>
+        </pc:spChg>
+        <pc:spChg chg="add del">
+          <ac:chgData name="Kandis Lamke" userId="9cb7febe679b7ad2" providerId="LiveId" clId="{6C3BA105-2B27-48A9-B6B4-03BC62812DFC}" dt="2020-03-28T19:45:56.656" v="5" actId="26606"/>
+          <ac:spMkLst>
+            <pc:docMk/>
+            <pc:sldMk cId="1954549449" sldId="264"/>
+            <ac:spMk id="17" creationId="{C04F8797-ED77-4C70-AAEA-0DE48267C25C}"/>
+          </ac:spMkLst>
+        </pc:spChg>
+        <pc:spChg chg="add del">
+          <ac:chgData name="Kandis Lamke" userId="9cb7febe679b7ad2" providerId="LiveId" clId="{6C3BA105-2B27-48A9-B6B4-03BC62812DFC}" dt="2020-03-28T19:45:56.656" v="5" actId="26606"/>
+          <ac:spMkLst>
+            <pc:docMk/>
+            <pc:sldMk cId="1954549449" sldId="264"/>
+            <ac:spMk id="18" creationId="{CAD06229-FEB7-4CC9-8BE7-1A9457B9C601}"/>
+          </ac:spMkLst>
+        </pc:spChg>
+        <pc:spChg chg="add del">
+          <ac:chgData name="Kandis Lamke" userId="9cb7febe679b7ad2" providerId="LiveId" clId="{6C3BA105-2B27-48A9-B6B4-03BC62812DFC}" dt="2020-03-28T19:46:01.923" v="7" actId="26606"/>
+          <ac:spMkLst>
+            <pc:docMk/>
+            <pc:sldMk cId="1954549449" sldId="264"/>
+            <ac:spMk id="21" creationId="{3D1E5586-8BB5-40F6-96C3-2E87DD7CE5CD}"/>
+          </ac:spMkLst>
+        </pc:spChg>
+        <pc:spChg chg="add del">
+          <ac:chgData name="Kandis Lamke" userId="9cb7febe679b7ad2" providerId="LiveId" clId="{6C3BA105-2B27-48A9-B6B4-03BC62812DFC}" dt="2020-03-28T19:46:08.300" v="9" actId="26606"/>
+          <ac:spMkLst>
+            <pc:docMk/>
+            <pc:sldMk cId="1954549449" sldId="264"/>
+            <ac:spMk id="25" creationId="{DF43132E-D4DF-4A83-9344-A782D0F5D9F6}"/>
+          </ac:spMkLst>
+        </pc:spChg>
+        <pc:spChg chg="add del">
+          <ac:chgData name="Kandis Lamke" userId="9cb7febe679b7ad2" providerId="LiveId" clId="{6C3BA105-2B27-48A9-B6B4-03BC62812DFC}" dt="2020-03-28T19:46:10.719" v="11" actId="26606"/>
+          <ac:spMkLst>
+            <pc:docMk/>
+            <pc:sldMk cId="1954549449" sldId="264"/>
+            <ac:spMk id="29" creationId="{CD9E0036-D626-45D9-B0FA-B920385A6152}"/>
+          </ac:spMkLst>
+        </pc:spChg>
+        <pc:spChg chg="add del">
+          <ac:chgData name="Kandis Lamke" userId="9cb7febe679b7ad2" providerId="LiveId" clId="{6C3BA105-2B27-48A9-B6B4-03BC62812DFC}" dt="2020-03-28T19:46:11.931" v="13" actId="26606"/>
+          <ac:spMkLst>
+            <pc:docMk/>
+            <pc:sldMk cId="1954549449" sldId="264"/>
+            <ac:spMk id="32" creationId="{3D1E5586-8BB5-40F6-96C3-2E87DD7CE5CD}"/>
+          </ac:spMkLst>
+        </pc:spChg>
+        <pc:spChg chg="add del">
+          <ac:chgData name="Kandis Lamke" userId="9cb7febe679b7ad2" providerId="LiveId" clId="{6C3BA105-2B27-48A9-B6B4-03BC62812DFC}" dt="2020-03-28T19:46:13.779" v="15" actId="26606"/>
+          <ac:spMkLst>
+            <pc:docMk/>
+            <pc:sldMk cId="1954549449" sldId="264"/>
+            <ac:spMk id="36" creationId="{C04F8797-ED77-4C70-AAEA-0DE48267C25C}"/>
+          </ac:spMkLst>
+        </pc:spChg>
+        <pc:spChg chg="add del">
+          <ac:chgData name="Kandis Lamke" userId="9cb7febe679b7ad2" providerId="LiveId" clId="{6C3BA105-2B27-48A9-B6B4-03BC62812DFC}" dt="2020-03-28T19:46:13.779" v="15" actId="26606"/>
+          <ac:spMkLst>
+            <pc:docMk/>
+            <pc:sldMk cId="1954549449" sldId="264"/>
+            <ac:spMk id="37" creationId="{CAD06229-FEB7-4CC9-8BE7-1A9457B9C601}"/>
+          </ac:spMkLst>
+        </pc:spChg>
+        <pc:spChg chg="add del">
+          <ac:chgData name="Kandis Lamke" userId="9cb7febe679b7ad2" providerId="LiveId" clId="{6C3BA105-2B27-48A9-B6B4-03BC62812DFC}" dt="2020-03-28T19:46:17.026" v="17" actId="26606"/>
+          <ac:spMkLst>
+            <pc:docMk/>
+            <pc:sldMk cId="1954549449" sldId="264"/>
+            <ac:spMk id="42" creationId="{1BE7BD64-C268-4BE6-8D67-F5DD171F0154}"/>
+          </ac:spMkLst>
+        </pc:spChg>
+        <pc:spChg chg="add del">
+          <ac:chgData name="Kandis Lamke" userId="9cb7febe679b7ad2" providerId="LiveId" clId="{6C3BA105-2B27-48A9-B6B4-03BC62812DFC}" dt="2020-03-28T19:46:17.026" v="17" actId="26606"/>
+          <ac:spMkLst>
+            <pc:docMk/>
+            <pc:sldMk cId="1954549449" sldId="264"/>
+            <ac:spMk id="46" creationId="{57E6F9A8-1B4B-4FEF-942A-15CA97ECE0BA}"/>
+          </ac:spMkLst>
+        </pc:spChg>
+        <pc:spChg chg="add del">
+          <ac:chgData name="Kandis Lamke" userId="9cb7febe679b7ad2" providerId="LiveId" clId="{6C3BA105-2B27-48A9-B6B4-03BC62812DFC}" dt="2020-03-28T19:46:21.703" v="19" actId="26606"/>
+          <ac:spMkLst>
+            <pc:docMk/>
+            <pc:sldMk cId="1954549449" sldId="264"/>
+            <ac:spMk id="49" creationId="{D5FE3208-9FD8-4883-AB1F-FF214491BBD4}"/>
+          </ac:spMkLst>
+        </pc:spChg>
+        <pc:spChg chg="add del">
+          <ac:chgData name="Kandis Lamke" userId="9cb7febe679b7ad2" providerId="LiveId" clId="{6C3BA105-2B27-48A9-B6B4-03BC62812DFC}" dt="2020-03-28T19:46:21.703" v="19" actId="26606"/>
+          <ac:spMkLst>
+            <pc:docMk/>
+            <pc:sldMk cId="1954549449" sldId="264"/>
+            <ac:spMk id="51" creationId="{1E6E1A7C-A9E7-4BB0-AD38-5060AA3E1937}"/>
+          </ac:spMkLst>
+        </pc:spChg>
+        <pc:spChg chg="add">
+          <ac:chgData name="Kandis Lamke" userId="9cb7febe679b7ad2" providerId="LiveId" clId="{6C3BA105-2B27-48A9-B6B4-03BC62812DFC}" dt="2020-03-28T19:46:21.762" v="20" actId="26606"/>
+          <ac:spMkLst>
+            <pc:docMk/>
+            <pc:sldMk cId="1954549449" sldId="264"/>
+            <ac:spMk id="54" creationId="{1BE7BD64-C268-4BE6-8D67-F5DD171F0154}"/>
+          </ac:spMkLst>
+        </pc:spChg>
+        <pc:spChg chg="add">
+          <ac:chgData name="Kandis Lamke" userId="9cb7febe679b7ad2" providerId="LiveId" clId="{6C3BA105-2B27-48A9-B6B4-03BC62812DFC}" dt="2020-03-28T19:46:21.762" v="20" actId="26606"/>
+          <ac:spMkLst>
+            <pc:docMk/>
+            <pc:sldMk cId="1954549449" sldId="264"/>
+            <ac:spMk id="58" creationId="{57E6F9A8-1B4B-4FEF-942A-15CA97ECE0BA}"/>
+          </ac:spMkLst>
+        </pc:spChg>
+        <pc:picChg chg="ord">
+          <ac:chgData name="Kandis Lamke" userId="9cb7febe679b7ad2" providerId="LiveId" clId="{6C3BA105-2B27-48A9-B6B4-03BC62812DFC}" dt="2020-03-28T19:46:21.762" v="20" actId="26606"/>
+          <ac:picMkLst>
+            <pc:docMk/>
+            <pc:sldMk cId="1954549449" sldId="264"/>
+            <ac:picMk id="2" creationId="{00000000-0000-0000-0000-000000000000}"/>
+          </ac:picMkLst>
+        </pc:picChg>
+        <pc:picChg chg="add del">
+          <ac:chgData name="Kandis Lamke" userId="9cb7febe679b7ad2" providerId="LiveId" clId="{6C3BA105-2B27-48A9-B6B4-03BC62812DFC}" dt="2020-03-28T19:45:49.691" v="3" actId="26606"/>
+          <ac:picMkLst>
+            <pc:docMk/>
+            <pc:sldMk cId="1954549449" sldId="264"/>
+            <ac:picMk id="8" creationId="{91DD536F-3F4A-4B15-A2D3-B9FB07F1233D}"/>
+          </ac:picMkLst>
+        </pc:picChg>
+        <pc:picChg chg="add del">
+          <ac:chgData name="Kandis Lamke" userId="9cb7febe679b7ad2" providerId="LiveId" clId="{6C3BA105-2B27-48A9-B6B4-03BC62812DFC}" dt="2020-03-28T19:45:56.656" v="5" actId="26606"/>
+          <ac:picMkLst>
+            <pc:docMk/>
+            <pc:sldMk cId="1954549449" sldId="264"/>
+            <ac:picMk id="14" creationId="{42B44E02-2041-49BE-AF61-F91454DC3AA8}"/>
+          </ac:picMkLst>
+        </pc:picChg>
+        <pc:picChg chg="add del">
+          <ac:chgData name="Kandis Lamke" userId="9cb7febe679b7ad2" providerId="LiveId" clId="{6C3BA105-2B27-48A9-B6B4-03BC62812DFC}" dt="2020-03-28T19:45:56.656" v="5" actId="26606"/>
+          <ac:picMkLst>
+            <pc:docMk/>
+            <pc:sldMk cId="1954549449" sldId="264"/>
+            <ac:picMk id="15" creationId="{91DD536F-3F4A-4B15-A2D3-B9FB07F1233D}"/>
+          </ac:picMkLst>
+        </pc:picChg>
+        <pc:picChg chg="add del">
+          <ac:chgData name="Kandis Lamke" userId="9cb7febe679b7ad2" providerId="LiveId" clId="{6C3BA105-2B27-48A9-B6B4-03BC62812DFC}" dt="2020-03-28T19:45:56.656" v="5" actId="26606"/>
+          <ac:picMkLst>
+            <pc:docMk/>
+            <pc:sldMk cId="1954549449" sldId="264"/>
+            <ac:picMk id="16" creationId="{08625290-97B7-41E9-9685-D438F86FC9EA}"/>
+          </ac:picMkLst>
+        </pc:picChg>
+        <pc:picChg chg="add del">
+          <ac:chgData name="Kandis Lamke" userId="9cb7febe679b7ad2" providerId="LiveId" clId="{6C3BA105-2B27-48A9-B6B4-03BC62812DFC}" dt="2020-03-28T19:46:01.923" v="7" actId="26606"/>
+          <ac:picMkLst>
+            <pc:docMk/>
+            <pc:sldMk cId="1954549449" sldId="264"/>
+            <ac:picMk id="20" creationId="{91DD536F-3F4A-4B15-A2D3-B9FB07F1233D}"/>
+          </ac:picMkLst>
+        </pc:picChg>
+        <pc:picChg chg="add del">
+          <ac:chgData name="Kandis Lamke" userId="9cb7febe679b7ad2" providerId="LiveId" clId="{6C3BA105-2B27-48A9-B6B4-03BC62812DFC}" dt="2020-03-28T19:46:08.300" v="9" actId="26606"/>
+          <ac:picMkLst>
+            <pc:docMk/>
+            <pc:sldMk cId="1954549449" sldId="264"/>
+            <ac:picMk id="24" creationId="{91DD536F-3F4A-4B15-A2D3-B9FB07F1233D}"/>
+          </ac:picMkLst>
+        </pc:picChg>
+        <pc:picChg chg="add del">
+          <ac:chgData name="Kandis Lamke" userId="9cb7febe679b7ad2" providerId="LiveId" clId="{6C3BA105-2B27-48A9-B6B4-03BC62812DFC}" dt="2020-03-28T19:46:10.719" v="11" actId="26606"/>
+          <ac:picMkLst>
+            <pc:docMk/>
+            <pc:sldMk cId="1954549449" sldId="264"/>
+            <ac:picMk id="28" creationId="{91DD536F-3F4A-4B15-A2D3-B9FB07F1233D}"/>
+          </ac:picMkLst>
+        </pc:picChg>
+        <pc:picChg chg="add del">
+          <ac:chgData name="Kandis Lamke" userId="9cb7febe679b7ad2" providerId="LiveId" clId="{6C3BA105-2B27-48A9-B6B4-03BC62812DFC}" dt="2020-03-28T19:46:11.931" v="13" actId="26606"/>
+          <ac:picMkLst>
+            <pc:docMk/>
+            <pc:sldMk cId="1954549449" sldId="264"/>
+            <ac:picMk id="31" creationId="{91DD536F-3F4A-4B15-A2D3-B9FB07F1233D}"/>
+          </ac:picMkLst>
+        </pc:picChg>
+        <pc:picChg chg="add del">
+          <ac:chgData name="Kandis Lamke" userId="9cb7febe679b7ad2" providerId="LiveId" clId="{6C3BA105-2B27-48A9-B6B4-03BC62812DFC}" dt="2020-03-28T19:46:13.779" v="15" actId="26606"/>
+          <ac:picMkLst>
+            <pc:docMk/>
+            <pc:sldMk cId="1954549449" sldId="264"/>
+            <ac:picMk id="35" creationId="{91DD536F-3F4A-4B15-A2D3-B9FB07F1233D}"/>
+          </ac:picMkLst>
+        </pc:picChg>
+        <pc:picChg chg="add del">
+          <ac:chgData name="Kandis Lamke" userId="9cb7febe679b7ad2" providerId="LiveId" clId="{6C3BA105-2B27-48A9-B6B4-03BC62812DFC}" dt="2020-03-28T19:46:13.779" v="15" actId="26606"/>
+          <ac:picMkLst>
+            <pc:docMk/>
+            <pc:sldMk cId="1954549449" sldId="264"/>
+            <ac:picMk id="38" creationId="{42B44E02-2041-49BE-AF61-F91454DC3AA8}"/>
+          </ac:picMkLst>
+        </pc:picChg>
+        <pc:picChg chg="add del">
+          <ac:chgData name="Kandis Lamke" userId="9cb7febe679b7ad2" providerId="LiveId" clId="{6C3BA105-2B27-48A9-B6B4-03BC62812DFC}" dt="2020-03-28T19:46:13.779" v="15" actId="26606"/>
+          <ac:picMkLst>
+            <pc:docMk/>
+            <pc:sldMk cId="1954549449" sldId="264"/>
+            <ac:picMk id="39" creationId="{08625290-97B7-41E9-9685-D438F86FC9EA}"/>
+          </ac:picMkLst>
+        </pc:picChg>
+        <pc:picChg chg="add del">
+          <ac:chgData name="Kandis Lamke" userId="9cb7febe679b7ad2" providerId="LiveId" clId="{6C3BA105-2B27-48A9-B6B4-03BC62812DFC}" dt="2020-03-28T19:46:17.026" v="17" actId="26606"/>
+          <ac:picMkLst>
+            <pc:docMk/>
+            <pc:sldMk cId="1954549449" sldId="264"/>
+            <ac:picMk id="41" creationId="{91DD536F-3F4A-4B15-A2D3-B9FB07F1233D}"/>
+          </ac:picMkLst>
+        </pc:picChg>
+        <pc:picChg chg="add del">
+          <ac:chgData name="Kandis Lamke" userId="9cb7febe679b7ad2" providerId="LiveId" clId="{6C3BA105-2B27-48A9-B6B4-03BC62812DFC}" dt="2020-03-28T19:46:17.026" v="17" actId="26606"/>
+          <ac:picMkLst>
+            <pc:docMk/>
+            <pc:sldMk cId="1954549449" sldId="264"/>
+            <ac:picMk id="43" creationId="{7D6C6E9A-567D-4054-B920-2E1BAF6D2426}"/>
+          </ac:picMkLst>
+        </pc:picChg>
+        <pc:picChg chg="add del">
+          <ac:chgData name="Kandis Lamke" userId="9cb7febe679b7ad2" providerId="LiveId" clId="{6C3BA105-2B27-48A9-B6B4-03BC62812DFC}" dt="2020-03-28T19:46:17.026" v="17" actId="26606"/>
+          <ac:picMkLst>
+            <pc:docMk/>
+            <pc:sldMk cId="1954549449" sldId="264"/>
+            <ac:picMk id="44" creationId="{94164FB2-EFB1-4531-A8F4-DD77A03E2CCB}"/>
+          </ac:picMkLst>
+        </pc:picChg>
+        <pc:picChg chg="add del">
+          <ac:chgData name="Kandis Lamke" userId="9cb7febe679b7ad2" providerId="LiveId" clId="{6C3BA105-2B27-48A9-B6B4-03BC62812DFC}" dt="2020-03-28T19:46:17.026" v="17" actId="26606"/>
+          <ac:picMkLst>
+            <pc:docMk/>
+            <pc:sldMk cId="1954549449" sldId="264"/>
+            <ac:picMk id="45" creationId="{0E6BC652-4BE1-478A-BFA7-47149E82F2F1}"/>
+          </ac:picMkLst>
+        </pc:picChg>
+        <pc:picChg chg="add del">
+          <ac:chgData name="Kandis Lamke" userId="9cb7febe679b7ad2" providerId="LiveId" clId="{6C3BA105-2B27-48A9-B6B4-03BC62812DFC}" dt="2020-03-28T19:46:21.703" v="19" actId="26606"/>
+          <ac:picMkLst>
+            <pc:docMk/>
+            <pc:sldMk cId="1954549449" sldId="264"/>
+            <ac:picMk id="48" creationId="{91DD536F-3F4A-4B15-A2D3-B9FB07F1233D}"/>
+          </ac:picMkLst>
+        </pc:picChg>
+        <pc:picChg chg="add del">
+          <ac:chgData name="Kandis Lamke" userId="9cb7febe679b7ad2" providerId="LiveId" clId="{6C3BA105-2B27-48A9-B6B4-03BC62812DFC}" dt="2020-03-28T19:46:21.703" v="19" actId="26606"/>
+          <ac:picMkLst>
+            <pc:docMk/>
+            <pc:sldMk cId="1954549449" sldId="264"/>
+            <ac:picMk id="50" creationId="{72E5EC71-6645-4F98-85CD-71B3EA38936C}"/>
+          </ac:picMkLst>
+        </pc:picChg>
+        <pc:picChg chg="add">
+          <ac:chgData name="Kandis Lamke" userId="9cb7febe679b7ad2" providerId="LiveId" clId="{6C3BA105-2B27-48A9-B6B4-03BC62812DFC}" dt="2020-03-28T19:46:21.762" v="20" actId="26606"/>
+          <ac:picMkLst>
+            <pc:docMk/>
+            <pc:sldMk cId="1954549449" sldId="264"/>
+            <ac:picMk id="53" creationId="{91DD536F-3F4A-4B15-A2D3-B9FB07F1233D}"/>
+          </ac:picMkLst>
+        </pc:picChg>
+        <pc:picChg chg="add">
+          <ac:chgData name="Kandis Lamke" userId="9cb7febe679b7ad2" providerId="LiveId" clId="{6C3BA105-2B27-48A9-B6B4-03BC62812DFC}" dt="2020-03-28T19:46:21.762" v="20" actId="26606"/>
+          <ac:picMkLst>
+            <pc:docMk/>
+            <pc:sldMk cId="1954549449" sldId="264"/>
+            <ac:picMk id="55" creationId="{7D6C6E9A-567D-4054-B920-2E1BAF6D2426}"/>
+          </ac:picMkLst>
+        </pc:picChg>
+        <pc:picChg chg="add">
+          <ac:chgData name="Kandis Lamke" userId="9cb7febe679b7ad2" providerId="LiveId" clId="{6C3BA105-2B27-48A9-B6B4-03BC62812DFC}" dt="2020-03-28T19:46:21.762" v="20" actId="26606"/>
+          <ac:picMkLst>
+            <pc:docMk/>
+            <pc:sldMk cId="1954549449" sldId="264"/>
+            <ac:picMk id="56" creationId="{94164FB2-EFB1-4531-A8F4-DD77A03E2CCB}"/>
+          </ac:picMkLst>
+        </pc:picChg>
+        <pc:picChg chg="add">
+          <ac:chgData name="Kandis Lamke" userId="9cb7febe679b7ad2" providerId="LiveId" clId="{6C3BA105-2B27-48A9-B6B4-03BC62812DFC}" dt="2020-03-28T19:46:21.762" v="20" actId="26606"/>
+          <ac:picMkLst>
+            <pc:docMk/>
+            <pc:sldMk cId="1954549449" sldId="264"/>
+            <ac:picMk id="57" creationId="{0E6BC652-4BE1-478A-BFA7-47149E82F2F1}"/>
+          </ac:picMkLst>
+        </pc:picChg>
+        <pc:cxnChg chg="add del">
+          <ac:chgData name="Kandis Lamke" userId="9cb7febe679b7ad2" providerId="LiveId" clId="{6C3BA105-2B27-48A9-B6B4-03BC62812DFC}" dt="2020-03-28T19:45:49.691" v="3" actId="26606"/>
+          <ac:cxnSpMkLst>
+            <pc:docMk/>
+            <pc:sldMk cId="1954549449" sldId="264"/>
+            <ac:cxnSpMk id="12" creationId="{6AA24BC1-1577-4586-AD7A-417660E37253}"/>
+          </ac:cxnSpMkLst>
+        </pc:cxnChg>
+        <pc:cxnChg chg="add del">
+          <ac:chgData name="Kandis Lamke" userId="9cb7febe679b7ad2" providerId="LiveId" clId="{6C3BA105-2B27-48A9-B6B4-03BC62812DFC}" dt="2020-03-28T19:46:01.923" v="7" actId="26606"/>
+          <ac:cxnSpMkLst>
+            <pc:docMk/>
+            <pc:sldMk cId="1954549449" sldId="264"/>
+            <ac:cxnSpMk id="22" creationId="{8A832D40-B9E2-4CE7-9E0A-B35591EA2035}"/>
+          </ac:cxnSpMkLst>
+        </pc:cxnChg>
+        <pc:cxnChg chg="add del">
+          <ac:chgData name="Kandis Lamke" userId="9cb7febe679b7ad2" providerId="LiveId" clId="{6C3BA105-2B27-48A9-B6B4-03BC62812DFC}" dt="2020-03-28T19:46:08.300" v="9" actId="26606"/>
+          <ac:cxnSpMkLst>
+            <pc:docMk/>
+            <pc:sldMk cId="1954549449" sldId="264"/>
+            <ac:cxnSpMk id="26" creationId="{6AA24BC1-1577-4586-AD7A-417660E37253}"/>
+          </ac:cxnSpMkLst>
+        </pc:cxnChg>
+        <pc:cxnChg chg="add del">
+          <ac:chgData name="Kandis Lamke" userId="9cb7febe679b7ad2" providerId="LiveId" clId="{6C3BA105-2B27-48A9-B6B4-03BC62812DFC}" dt="2020-03-28T19:46:11.931" v="13" actId="26606"/>
+          <ac:cxnSpMkLst>
+            <pc:docMk/>
+            <pc:sldMk cId="1954549449" sldId="264"/>
+            <ac:cxnSpMk id="33" creationId="{8A832D40-B9E2-4CE7-9E0A-B35591EA2035}"/>
+          </ac:cxnSpMkLst>
+        </pc:cxnChg>
+      </pc:sldChg>
+      <pc:sldChg chg="modSp mod">
+        <pc:chgData name="Kandis Lamke" userId="9cb7febe679b7ad2" providerId="LiveId" clId="{6C3BA105-2B27-48A9-B6B4-03BC62812DFC}" dt="2020-03-28T19:48:54.675" v="82" actId="20577"/>
+        <pc:sldMkLst>
+          <pc:docMk/>
+          <pc:sldMk cId="2128279396" sldId="266"/>
+        </pc:sldMkLst>
+        <pc:spChg chg="mod">
+          <ac:chgData name="Kandis Lamke" userId="9cb7febe679b7ad2" providerId="LiveId" clId="{6C3BA105-2B27-48A9-B6B4-03BC62812DFC}" dt="2020-03-28T19:48:54.675" v="82" actId="20577"/>
+          <ac:spMkLst>
+            <pc:docMk/>
+            <pc:sldMk cId="2128279396" sldId="266"/>
+            <ac:spMk id="3" creationId="{00000000-0000-0000-0000-000000000000}"/>
+          </ac:spMkLst>
+        </pc:spChg>
+      </pc:sldChg>
+      <pc:sldChg chg="modSp mod">
+        <pc:chgData name="Kandis Lamke" userId="9cb7febe679b7ad2" providerId="LiveId" clId="{6C3BA105-2B27-48A9-B6B4-03BC62812DFC}" dt="2020-03-28T19:49:44.224" v="159" actId="20577"/>
+        <pc:sldMkLst>
+          <pc:docMk/>
+          <pc:sldMk cId="1331526367" sldId="270"/>
+        </pc:sldMkLst>
+        <pc:spChg chg="mod">
+          <ac:chgData name="Kandis Lamke" userId="9cb7febe679b7ad2" providerId="LiveId" clId="{6C3BA105-2B27-48A9-B6B4-03BC62812DFC}" dt="2020-03-28T19:49:44.224" v="159" actId="20577"/>
+          <ac:spMkLst>
+            <pc:docMk/>
+            <pc:sldMk cId="1331526367" sldId="270"/>
+            <ac:spMk id="3" creationId="{00000000-0000-0000-0000-000000000000}"/>
+          </ac:spMkLst>
+        </pc:spChg>
+      </pc:sldChg>
+      <pc:sldChg chg="modSp mod">
+        <pc:chgData name="Kandis Lamke" userId="9cb7febe679b7ad2" providerId="LiveId" clId="{6C3BA105-2B27-48A9-B6B4-03BC62812DFC}" dt="2020-03-28T19:49:22.659" v="136" actId="20577"/>
+        <pc:sldMkLst>
+          <pc:docMk/>
+          <pc:sldMk cId="363968032" sldId="272"/>
+        </pc:sldMkLst>
+        <pc:spChg chg="mod">
+          <ac:chgData name="Kandis Lamke" userId="9cb7febe679b7ad2" providerId="LiveId" clId="{6C3BA105-2B27-48A9-B6B4-03BC62812DFC}" dt="2020-03-28T19:49:22.659" v="136" actId="20577"/>
+          <ac:spMkLst>
+            <pc:docMk/>
+            <pc:sldMk cId="363968032" sldId="272"/>
+            <ac:spMk id="3" creationId="{00000000-0000-0000-0000-000000000000}"/>
+          </ac:spMkLst>
+        </pc:spChg>
+      </pc:sldChg>
+      <pc:sldChg chg="modSp mod">
+        <pc:chgData name="Kandis Lamke" userId="9cb7febe679b7ad2" providerId="LiveId" clId="{6C3BA105-2B27-48A9-B6B4-03BC62812DFC}" dt="2020-03-28T19:49:50.802" v="173" actId="20577"/>
+        <pc:sldMkLst>
+          <pc:docMk/>
+          <pc:sldMk cId="1745092152" sldId="274"/>
+        </pc:sldMkLst>
+        <pc:spChg chg="mod">
+          <ac:chgData name="Kandis Lamke" userId="9cb7febe679b7ad2" providerId="LiveId" clId="{6C3BA105-2B27-48A9-B6B4-03BC62812DFC}" dt="2020-03-28T19:49:50.802" v="173" actId="20577"/>
+          <ac:spMkLst>
+            <pc:docMk/>
+            <pc:sldMk cId="1745092152" sldId="274"/>
+            <ac:spMk id="3" creationId="{00000000-0000-0000-0000-000000000000}"/>
+          </ac:spMkLst>
+        </pc:spChg>
+      </pc:sldChg>
+      <pc:sldChg chg="addSp delSp modSp mod setBg">
+        <pc:chgData name="Kandis Lamke" userId="9cb7febe679b7ad2" providerId="LiveId" clId="{6C3BA105-2B27-48A9-B6B4-03BC62812DFC}" dt="2020-03-29T22:58:38.763" v="742" actId="20577"/>
+        <pc:sldMkLst>
+          <pc:docMk/>
+          <pc:sldMk cId="2085319269" sldId="277"/>
+        </pc:sldMkLst>
+        <pc:spChg chg="add del mod">
+          <ac:chgData name="Kandis Lamke" userId="9cb7febe679b7ad2" providerId="LiveId" clId="{6C3BA105-2B27-48A9-B6B4-03BC62812DFC}" dt="2020-03-29T19:06:38.130" v="210" actId="26606"/>
+          <ac:spMkLst>
+            <pc:docMk/>
+            <pc:sldMk cId="2085319269" sldId="277"/>
+            <ac:spMk id="3" creationId="{00000000-0000-0000-0000-000000000000}"/>
+          </ac:spMkLst>
+        </pc:spChg>
+        <pc:spChg chg="add del mod">
+          <ac:chgData name="Kandis Lamke" userId="9cb7febe679b7ad2" providerId="LiveId" clId="{6C3BA105-2B27-48A9-B6B4-03BC62812DFC}" dt="2020-03-29T19:06:40.493" v="211"/>
+          <ac:spMkLst>
+            <pc:docMk/>
+            <pc:sldMk cId="2085319269" sldId="277"/>
+            <ac:spMk id="4" creationId="{4A86B3AE-78E8-4ACE-9E4A-0B8D08ED3F97}"/>
+          </ac:spMkLst>
+        </pc:spChg>
+        <pc:spChg chg="add del mod">
+          <ac:chgData name="Kandis Lamke" userId="9cb7febe679b7ad2" providerId="LiveId" clId="{6C3BA105-2B27-48A9-B6B4-03BC62812DFC}" dt="2020-03-29T19:06:40.493" v="211"/>
+          <ac:spMkLst>
+            <pc:docMk/>
+            <pc:sldMk cId="2085319269" sldId="277"/>
+            <ac:spMk id="5" creationId="{CC01D125-2BF7-434D-B3B7-A7796C65D131}"/>
+          </ac:spMkLst>
+        </pc:spChg>
+        <pc:spChg chg="add mod">
+          <ac:chgData name="Kandis Lamke" userId="9cb7febe679b7ad2" providerId="LiveId" clId="{6C3BA105-2B27-48A9-B6B4-03BC62812DFC}" dt="2020-03-29T22:58:38.763" v="742" actId="20577"/>
+          <ac:spMkLst>
+            <pc:docMk/>
+            <pc:sldMk cId="2085319269" sldId="277"/>
+            <ac:spMk id="6" creationId="{FD079600-C61A-49C3-B6F5-651F4C6BE524}"/>
+          </ac:spMkLst>
+        </pc:spChg>
+        <pc:spChg chg="add del">
+          <ac:chgData name="Kandis Lamke" userId="9cb7febe679b7ad2" providerId="LiveId" clId="{6C3BA105-2B27-48A9-B6B4-03BC62812DFC}" dt="2020-03-29T19:06:33.929" v="208" actId="26606"/>
+          <ac:spMkLst>
+            <pc:docMk/>
+            <pc:sldMk cId="2085319269" sldId="277"/>
+            <ac:spMk id="10" creationId="{DF43132E-D4DF-4A83-9344-A782D0F5D9F6}"/>
+          </ac:spMkLst>
+        </pc:spChg>
+        <pc:spChg chg="add del">
+          <ac:chgData name="Kandis Lamke" userId="9cb7febe679b7ad2" providerId="LiveId" clId="{6C3BA105-2B27-48A9-B6B4-03BC62812DFC}" dt="2020-03-29T19:06:38.130" v="210" actId="26606"/>
+          <ac:spMkLst>
+            <pc:docMk/>
+            <pc:sldMk cId="2085319269" sldId="277"/>
+            <ac:spMk id="14" creationId="{3D1E5586-8BB5-40F6-96C3-2E87DD7CE5CD}"/>
+          </ac:spMkLst>
+        </pc:spChg>
+        <pc:picChg chg="ord">
+          <ac:chgData name="Kandis Lamke" userId="9cb7febe679b7ad2" providerId="LiveId" clId="{6C3BA105-2B27-48A9-B6B4-03BC62812DFC}" dt="2020-03-29T19:06:38.130" v="210" actId="26606"/>
+          <ac:picMkLst>
+            <pc:docMk/>
+            <pc:sldMk cId="2085319269" sldId="277"/>
+            <ac:picMk id="2" creationId="{00000000-0000-0000-0000-000000000000}"/>
+          </ac:picMkLst>
+        </pc:picChg>
+        <pc:cxnChg chg="add del">
+          <ac:chgData name="Kandis Lamke" userId="9cb7febe679b7ad2" providerId="LiveId" clId="{6C3BA105-2B27-48A9-B6B4-03BC62812DFC}" dt="2020-03-29T19:06:33.929" v="208" actId="26606"/>
+          <ac:cxnSpMkLst>
+            <pc:docMk/>
+            <pc:sldMk cId="2085319269" sldId="277"/>
+            <ac:cxnSpMk id="12" creationId="{6AA24BC1-1577-4586-AD7A-417660E37253}"/>
+          </ac:cxnSpMkLst>
+        </pc:cxnChg>
+        <pc:cxnChg chg="add del">
+          <ac:chgData name="Kandis Lamke" userId="9cb7febe679b7ad2" providerId="LiveId" clId="{6C3BA105-2B27-48A9-B6B4-03BC62812DFC}" dt="2020-03-29T19:06:38.130" v="210" actId="26606"/>
+          <ac:cxnSpMkLst>
+            <pc:docMk/>
+            <pc:sldMk cId="2085319269" sldId="277"/>
+            <ac:cxnSpMk id="15" creationId="{8A832D40-B9E2-4CE7-9E0A-B35591EA2035}"/>
+          </ac:cxnSpMkLst>
+        </pc:cxnChg>
+      </pc:sldChg>
+      <pc:sldChg chg="modSp mod">
+        <pc:chgData name="Kandis Lamke" userId="9cb7febe679b7ad2" providerId="LiveId" clId="{6C3BA105-2B27-48A9-B6B4-03BC62812DFC}" dt="2020-03-28T19:49:28.309" v="145" actId="5793"/>
+        <pc:sldMkLst>
+          <pc:docMk/>
+          <pc:sldMk cId="1913698023" sldId="278"/>
+        </pc:sldMkLst>
+        <pc:spChg chg="mod">
+          <ac:chgData name="Kandis Lamke" userId="9cb7febe679b7ad2" providerId="LiveId" clId="{6C3BA105-2B27-48A9-B6B4-03BC62812DFC}" dt="2020-03-28T19:49:28.309" v="145" actId="5793"/>
+          <ac:spMkLst>
+            <pc:docMk/>
+            <pc:sldMk cId="1913698023" sldId="278"/>
+            <ac:spMk id="3" creationId="{00000000-0000-0000-0000-000000000000}"/>
+          </ac:spMkLst>
+        </pc:spChg>
+      </pc:sldChg>
+      <pc:sldChg chg="add del">
+        <pc:chgData name="Kandis Lamke" userId="9cb7febe679b7ad2" providerId="LiveId" clId="{6C3BA105-2B27-48A9-B6B4-03BC62812DFC}" dt="2020-03-28T19:50:36.617" v="176" actId="2696"/>
+        <pc:sldMkLst>
+          <pc:docMk/>
+          <pc:sldMk cId="4145799849" sldId="279"/>
+        </pc:sldMkLst>
+      </pc:sldChg>
+      <pc:sldChg chg="modSp add mod">
+        <pc:chgData name="Kandis Lamke" userId="9cb7febe679b7ad2" providerId="LiveId" clId="{6C3BA105-2B27-48A9-B6B4-03BC62812DFC}" dt="2020-03-28T19:51:11.561" v="196" actId="403"/>
+        <pc:sldMkLst>
+          <pc:docMk/>
+          <pc:sldMk cId="788715917" sldId="280"/>
+        </pc:sldMkLst>
+        <pc:spChg chg="mod">
+          <ac:chgData name="Kandis Lamke" userId="9cb7febe679b7ad2" providerId="LiveId" clId="{6C3BA105-2B27-48A9-B6B4-03BC62812DFC}" dt="2020-03-28T19:51:11.561" v="196" actId="403"/>
+          <ac:spMkLst>
+            <pc:docMk/>
+            <pc:sldMk cId="788715917" sldId="280"/>
+            <ac:spMk id="3" creationId="{00000000-0000-0000-0000-000000000000}"/>
+          </ac:spMkLst>
+        </pc:spChg>
+      </pc:sldChg>
+    </pc:docChg>
+  </pc:docChgLst>
+</pc:chgInfo>
 </file>
 
 <file path=ppt/notesMasters/notesMaster1.xml><?xml version="1.0" encoding="utf-8"?>
@@ -6204,23 +6777,7 @@
                   <a:schemeClr val="tx1"/>
                 </a:solidFill>
               </a:rPr>
-              <a:t>April 3</a:t>
-            </a:r>
-            <a:r>
-              <a:rPr lang="en-US" sz="1400" baseline="30000" dirty="0">
-                <a:solidFill>
-                  <a:schemeClr val="tx1"/>
-                </a:solidFill>
-              </a:rPr>
-              <a:t>rd</a:t>
-            </a:r>
-            <a:r>
-              <a:rPr lang="en-US" sz="1400" dirty="0">
-                <a:solidFill>
-                  <a:schemeClr val="tx1"/>
-                </a:solidFill>
-              </a:rPr>
-              <a:t>, 2020</a:t>
+              <a:t>April 3, 2020</a:t>
             </a:r>
           </a:p>
         </p:txBody>
@@ -6401,7 +6958,7 @@
           <a:p>
             <a:r>
               <a:rPr lang="en-US" dirty="0"/>
-              <a:t>Project development</a:t>
+              <a:t>Project results</a:t>
             </a:r>
           </a:p>
         </p:txBody>
@@ -6558,7 +7115,7 @@
           <a:p>
             <a:r>
               <a:rPr lang="en-US" dirty="0"/>
-              <a:t>results</a:t>
+              <a:t>Project results</a:t>
             </a:r>
           </a:p>
         </p:txBody>
@@ -7038,6 +7595,164 @@
     <p:extLst>
       <p:ext uri="{BB962C8B-B14F-4D97-AF65-F5344CB8AC3E}">
         <p14:creationId xmlns:p14="http://schemas.microsoft.com/office/powerpoint/2010/main" val="588749337"/>
+      </p:ext>
+    </p:extLst>
+  </p:cSld>
+  <p:clrMapOvr>
+    <a:masterClrMapping/>
+  </p:clrMapOvr>
+</p:sld>
+</file>
+
+<file path=ppt/slides/slide15.xml><?xml version="1.0" encoding="utf-8"?>
+<p:sld xmlns:a="http://schemas.openxmlformats.org/drawingml/2006/main" xmlns:r="http://schemas.openxmlformats.org/officeDocument/2006/relationships" xmlns:p="http://schemas.openxmlformats.org/presentationml/2006/main">
+  <p:cSld>
+    <p:spTree>
+      <p:nvGrpSpPr>
+        <p:cNvPr id="1" name=""/>
+        <p:cNvGrpSpPr/>
+        <p:nvPr/>
+      </p:nvGrpSpPr>
+      <p:grpSpPr>
+        <a:xfrm>
+          <a:off x="0" y="0"/>
+          <a:ext cx="0" cy="0"/>
+          <a:chOff x="0" y="0"/>
+          <a:chExt cx="0" cy="0"/>
+        </a:xfrm>
+      </p:grpSpPr>
+      <p:pic>
+        <p:nvPicPr>
+          <p:cNvPr id="2" name="Picture 1"/>
+          <p:cNvPicPr>
+            <a:picLocks noChangeAspect="1"/>
+          </p:cNvPicPr>
+          <p:nvPr/>
+        </p:nvPicPr>
+        <p:blipFill>
+          <a:blip r:embed="rId2"/>
+          <a:stretch>
+            <a:fillRect/>
+          </a:stretch>
+        </p:blipFill>
+        <p:spPr>
+          <a:xfrm>
+            <a:off x="8001370" y="6277777"/>
+            <a:ext cx="1049134" cy="475733"/>
+          </a:xfrm>
+          <a:prstGeom prst="rect">
+            <a:avLst/>
+          </a:prstGeom>
+        </p:spPr>
+      </p:pic>
+      <p:sp>
+        <p:nvSpPr>
+          <p:cNvPr id="3" name="Title 1"/>
+          <p:cNvSpPr txBox="1">
+            <a:spLocks/>
+          </p:cNvSpPr>
+          <p:nvPr/>
+        </p:nvSpPr>
+        <p:spPr>
+          <a:xfrm>
+            <a:off x="1294566" y="2833444"/>
+            <a:ext cx="6554867" cy="595556"/>
+          </a:xfrm>
+          <a:prstGeom prst="rect">
+            <a:avLst/>
+          </a:prstGeom>
+        </p:spPr>
+        <p:txBody>
+          <a:bodyPr/>
+          <a:lstStyle>
+            <a:lvl1pPr algn="l" defTabSz="457200" rtl="0" eaLnBrk="1" latinLnBrk="0" hangingPunct="1">
+              <a:spcBef>
+                <a:spcPct val="0"/>
+              </a:spcBef>
+              <a:buNone/>
+              <a:defRPr sz="3200" kern="1200" cap="all">
+                <a:ln w="3175" cmpd="sng">
+                  <a:noFill/>
+                </a:ln>
+                <a:solidFill>
+                  <a:schemeClr val="tx1"/>
+                </a:solidFill>
+                <a:effectLst/>
+                <a:latin typeface="+mj-lt"/>
+                <a:ea typeface="+mj-ea"/>
+                <a:cs typeface="+mj-cs"/>
+              </a:defRPr>
+            </a:lvl1pPr>
+            <a:lvl2pPr eaLnBrk="1" hangingPunct="1">
+              <a:defRPr>
+                <a:solidFill>
+                  <a:schemeClr val="tx2"/>
+                </a:solidFill>
+              </a:defRPr>
+            </a:lvl2pPr>
+            <a:lvl3pPr eaLnBrk="1" hangingPunct="1">
+              <a:defRPr>
+                <a:solidFill>
+                  <a:schemeClr val="tx2"/>
+                </a:solidFill>
+              </a:defRPr>
+            </a:lvl3pPr>
+            <a:lvl4pPr eaLnBrk="1" hangingPunct="1">
+              <a:defRPr>
+                <a:solidFill>
+                  <a:schemeClr val="tx2"/>
+                </a:solidFill>
+              </a:defRPr>
+            </a:lvl4pPr>
+            <a:lvl5pPr eaLnBrk="1" hangingPunct="1">
+              <a:defRPr>
+                <a:solidFill>
+                  <a:schemeClr val="tx2"/>
+                </a:solidFill>
+              </a:defRPr>
+            </a:lvl5pPr>
+            <a:lvl6pPr eaLnBrk="1" hangingPunct="1">
+              <a:defRPr>
+                <a:solidFill>
+                  <a:schemeClr val="tx2"/>
+                </a:solidFill>
+              </a:defRPr>
+            </a:lvl6pPr>
+            <a:lvl7pPr eaLnBrk="1" hangingPunct="1">
+              <a:defRPr>
+                <a:solidFill>
+                  <a:schemeClr val="tx2"/>
+                </a:solidFill>
+              </a:defRPr>
+            </a:lvl7pPr>
+            <a:lvl8pPr eaLnBrk="1" hangingPunct="1">
+              <a:defRPr>
+                <a:solidFill>
+                  <a:schemeClr val="tx2"/>
+                </a:solidFill>
+              </a:defRPr>
+            </a:lvl8pPr>
+            <a:lvl9pPr eaLnBrk="1" hangingPunct="1">
+              <a:defRPr>
+                <a:solidFill>
+                  <a:schemeClr val="tx2"/>
+                </a:solidFill>
+              </a:defRPr>
+            </a:lvl9pPr>
+          </a:lstStyle>
+          <a:p>
+            <a:pPr algn="ctr"/>
+            <a:r>
+              <a:rPr lang="en-US" sz="4400" b="1" dirty="0"/>
+              <a:t>QUESTIONS?</a:t>
+            </a:r>
+          </a:p>
+        </p:txBody>
+      </p:sp>
+    </p:spTree>
+    <p:extLst>
+      <p:ext uri="{BB962C8B-B14F-4D97-AF65-F5344CB8AC3E}">
+        <p14:creationId xmlns:p14="http://schemas.microsoft.com/office/powerpoint/2010/main" val="788715917"/>
       </p:ext>
     </p:extLst>
   </p:cSld>
@@ -7783,6 +8498,15 @@
 <file path=ppt/slides/slide5.xml><?xml version="1.0" encoding="utf-8"?>
 <p:sld xmlns:a="http://schemas.openxmlformats.org/drawingml/2006/main" xmlns:r="http://schemas.openxmlformats.org/officeDocument/2006/relationships" xmlns:p="http://schemas.openxmlformats.org/presentationml/2006/main">
   <p:cSld>
+    <p:bg>
+      <p:bgPr>
+        <a:blipFill>
+          <a:blip r:embed="rId2"/>
+          <a:stretch/>
+        </a:blipFill>
+        <a:effectLst/>
+      </p:bgPr>
+    </p:bg>
     <p:spTree>
       <p:nvGrpSpPr>
         <p:cNvPr id="1" name=""/>
@@ -7799,6 +8523,2172 @@
       </p:grpSpPr>
       <p:pic>
         <p:nvPicPr>
+          <p:cNvPr id="53" name="Picture 7">
+            <a:extLst>
+              <a:ext uri="{FF2B5EF4-FFF2-40B4-BE49-F238E27FC236}">
+                <a16:creationId xmlns:a16="http://schemas.microsoft.com/office/drawing/2014/main" id="{91DD536F-3F4A-4B15-A2D3-B9FB07F1233D}"/>
+              </a:ext>
+              <a:ext uri="{C183D7F6-B498-43B3-948B-1728B52AA6E4}">
+                <adec:decorative xmlns:adec="http://schemas.microsoft.com/office/drawing/2017/decorative" val="1"/>
+              </a:ext>
+            </a:extLst>
+          </p:cNvPr>
+          <p:cNvPicPr>
+            <a:picLocks noGrp="1" noRot="1" noChangeAspect="1" noMove="1" noResize="1" noEditPoints="1" noAdjustHandles="1" noChangeArrowheads="1" noChangeShapeType="1" noCrop="1"/>
+          </p:cNvPicPr>
+          <p:nvPr>
+            <p:extLst>
+              <p:ext uri="{386F3935-93C4-4BCD-93E2-E3B085C9AB24}">
+                <p16:designElem xmlns:p16="http://schemas.microsoft.com/office/powerpoint/2015/main" val="1"/>
+              </p:ext>
+            </p:extLst>
+          </p:nvPr>
+        </p:nvPicPr>
+        <p:blipFill>
+          <a:blip r:embed="rId3">
+            <a:extLst>
+              <a:ext uri="{28A0092B-C50C-407E-A947-70E740481C1C}">
+                <a14:useLocalDpi xmlns:a14="http://schemas.microsoft.com/office/drawing/2010/main" val="0"/>
+              </a:ext>
+            </a:extLst>
+          </a:blip>
+          <a:stretch>
+            <a:fillRect/>
+          </a:stretch>
+        </p:blipFill>
+        <p:spPr>
+          <a:xfrm>
+            <a:off x="0" y="0"/>
+            <a:ext cx="7397750" cy="6858000"/>
+          </a:xfrm>
+          <a:prstGeom prst="rect">
+            <a:avLst/>
+          </a:prstGeom>
+        </p:spPr>
+      </p:pic>
+      <p:sp useBgFill="1">
+        <p:nvSpPr>
+          <p:cNvPr id="54" name="Rectangle 9">
+            <a:extLst>
+              <a:ext uri="{FF2B5EF4-FFF2-40B4-BE49-F238E27FC236}">
+                <a16:creationId xmlns:a16="http://schemas.microsoft.com/office/drawing/2014/main" id="{1BE7BD64-C268-4BE6-8D67-F5DD171F0154}"/>
+              </a:ext>
+              <a:ext uri="{C183D7F6-B498-43B3-948B-1728B52AA6E4}">
+                <adec:decorative xmlns:adec="http://schemas.microsoft.com/office/drawing/2017/decorative" val="1"/>
+              </a:ext>
+            </a:extLst>
+          </p:cNvPr>
+          <p:cNvSpPr>
+            <a:spLocks noGrp="1" noRot="1" noChangeAspect="1" noMove="1" noResize="1" noEditPoints="1" noAdjustHandles="1" noChangeArrowheads="1" noChangeShapeType="1" noTextEdit="1"/>
+          </p:cNvSpPr>
+          <p:nvPr>
+            <p:extLst>
+              <p:ext uri="{386F3935-93C4-4BCD-93E2-E3B085C9AB24}">
+                <p16:designElem xmlns:p16="http://schemas.microsoft.com/office/powerpoint/2015/main" val="1"/>
+              </p:ext>
+            </p:extLst>
+          </p:nvPr>
+        </p:nvSpPr>
+        <p:spPr>
+          <a:xfrm>
+            <a:off x="0" y="857250"/>
+            <a:ext cx="9144000" cy="5143500"/>
+          </a:xfrm>
+          <a:prstGeom prst="rect">
+            <a:avLst/>
+          </a:prstGeom>
+          <a:ln>
+            <a:noFill/>
+          </a:ln>
+        </p:spPr>
+        <p:style>
+          <a:lnRef idx="2">
+            <a:schemeClr val="accent1">
+              <a:shade val="50000"/>
+            </a:schemeClr>
+          </a:lnRef>
+          <a:fillRef idx="1">
+            <a:schemeClr val="accent1"/>
+          </a:fillRef>
+          <a:effectRef idx="0">
+            <a:schemeClr val="accent1"/>
+          </a:effectRef>
+          <a:fontRef idx="minor">
+            <a:schemeClr val="lt1"/>
+          </a:fontRef>
+        </p:style>
+        <p:txBody>
+          <a:bodyPr rtlCol="0" anchor="ctr"/>
+          <a:lstStyle/>
+          <a:p>
+            <a:pPr algn="ctr"/>
+            <a:endParaRPr lang="en-US" sz="1350"/>
+          </a:p>
+        </p:txBody>
+      </p:sp>
+      <p:pic>
+        <p:nvPicPr>
+          <p:cNvPr id="55" name="Picture 11">
+            <a:extLst>
+              <a:ext uri="{FF2B5EF4-FFF2-40B4-BE49-F238E27FC236}">
+                <a16:creationId xmlns:a16="http://schemas.microsoft.com/office/drawing/2014/main" id="{7D6C6E9A-567D-4054-B920-2E1BAF6D2426}"/>
+              </a:ext>
+              <a:ext uri="{C183D7F6-B498-43B3-948B-1728B52AA6E4}">
+                <adec:decorative xmlns:adec="http://schemas.microsoft.com/office/drawing/2017/decorative" val="1"/>
+              </a:ext>
+            </a:extLst>
+          </p:cNvPr>
+          <p:cNvPicPr>
+            <a:picLocks noGrp="1" noRot="1" noChangeAspect="1" noMove="1" noResize="1" noEditPoints="1" noAdjustHandles="1" noChangeArrowheads="1" noChangeShapeType="1" noCrop="1"/>
+          </p:cNvPicPr>
+          <p:nvPr>
+            <p:extLst>
+              <p:ext uri="{386F3935-93C4-4BCD-93E2-E3B085C9AB24}">
+                <p16:designElem xmlns:p16="http://schemas.microsoft.com/office/powerpoint/2015/main" val="1"/>
+              </p:ext>
+            </p:extLst>
+          </p:nvPr>
+        </p:nvPicPr>
+        <p:blipFill>
+          <a:blip r:embed="rId4">
+            <a:extLst>
+              <a:ext uri="{28A0092B-C50C-407E-A947-70E740481C1C}">
+                <a14:useLocalDpi xmlns:a14="http://schemas.microsoft.com/office/drawing/2010/main" val="0"/>
+              </a:ext>
+            </a:extLst>
+          </a:blip>
+          <a:srcRect/>
+          <a:stretch>
+            <a:fillRect/>
+          </a:stretch>
+        </p:blipFill>
+        <p:spPr>
+          <a:xfrm>
+            <a:off x="1" y="857250"/>
+            <a:ext cx="7257143" cy="4082143"/>
+          </a:xfrm>
+          <a:custGeom>
+            <a:avLst/>
+            <a:gdLst>
+              <a:gd name="connsiteX0" fmla="*/ 0 w 9676190"/>
+              <a:gd name="connsiteY0" fmla="*/ 0 h 5442857"/>
+              <a:gd name="connsiteX1" fmla="*/ 9676190 w 9676190"/>
+              <a:gd name="connsiteY1" fmla="*/ 0 h 5442857"/>
+              <a:gd name="connsiteX2" fmla="*/ 9676190 w 9676190"/>
+              <a:gd name="connsiteY2" fmla="*/ 5442857 h 5442857"/>
+              <a:gd name="connsiteX3" fmla="*/ 1890711 w 9676190"/>
+              <a:gd name="connsiteY3" fmla="*/ 5442857 h 5442857"/>
+              <a:gd name="connsiteX4" fmla="*/ 1883227 w 9676190"/>
+              <a:gd name="connsiteY4" fmla="*/ 5203371 h 5442857"/>
+              <a:gd name="connsiteX5" fmla="*/ 1872341 w 9676190"/>
+              <a:gd name="connsiteY5" fmla="*/ 5170714 h 5442857"/>
+              <a:gd name="connsiteX6" fmla="*/ 1828798 w 9676190"/>
+              <a:gd name="connsiteY6" fmla="*/ 5116285 h 5442857"/>
+              <a:gd name="connsiteX7" fmla="*/ 1796141 w 9676190"/>
+              <a:gd name="connsiteY7" fmla="*/ 4953000 h 5442857"/>
+              <a:gd name="connsiteX8" fmla="*/ 1817912 w 9676190"/>
+              <a:gd name="connsiteY8" fmla="*/ 4909457 h 5442857"/>
+              <a:gd name="connsiteX9" fmla="*/ 1741712 w 9676190"/>
+              <a:gd name="connsiteY9" fmla="*/ 4789714 h 5442857"/>
+              <a:gd name="connsiteX10" fmla="*/ 1730827 w 9676190"/>
+              <a:gd name="connsiteY10" fmla="*/ 4757057 h 5442857"/>
+              <a:gd name="connsiteX11" fmla="*/ 1687284 w 9676190"/>
+              <a:gd name="connsiteY11" fmla="*/ 4702628 h 5442857"/>
+              <a:gd name="connsiteX12" fmla="*/ 1632855 w 9676190"/>
+              <a:gd name="connsiteY12" fmla="*/ 4593771 h 5442857"/>
+              <a:gd name="connsiteX13" fmla="*/ 1600198 w 9676190"/>
+              <a:gd name="connsiteY13" fmla="*/ 4572000 h 5442857"/>
+              <a:gd name="connsiteX14" fmla="*/ 1578427 w 9676190"/>
+              <a:gd name="connsiteY14" fmla="*/ 4550228 h 5442857"/>
+              <a:gd name="connsiteX15" fmla="*/ 1556655 w 9676190"/>
+              <a:gd name="connsiteY15" fmla="*/ 4517571 h 5442857"/>
+              <a:gd name="connsiteX16" fmla="*/ 1523998 w 9676190"/>
+              <a:gd name="connsiteY16" fmla="*/ 4506685 h 5442857"/>
+              <a:gd name="connsiteX17" fmla="*/ 1491341 w 9676190"/>
+              <a:gd name="connsiteY17" fmla="*/ 4484914 h 5442857"/>
+              <a:gd name="connsiteX18" fmla="*/ 1415141 w 9676190"/>
+              <a:gd name="connsiteY18" fmla="*/ 4463143 h 5442857"/>
+              <a:gd name="connsiteX19" fmla="*/ 1349827 w 9676190"/>
+              <a:gd name="connsiteY19" fmla="*/ 4397828 h 5442857"/>
+              <a:gd name="connsiteX20" fmla="*/ 1328055 w 9676190"/>
+              <a:gd name="connsiteY20" fmla="*/ 4376057 h 5442857"/>
+              <a:gd name="connsiteX21" fmla="*/ 1295398 w 9676190"/>
+              <a:gd name="connsiteY21" fmla="*/ 4354285 h 5442857"/>
+              <a:gd name="connsiteX22" fmla="*/ 1262741 w 9676190"/>
+              <a:gd name="connsiteY22" fmla="*/ 4321628 h 5442857"/>
+              <a:gd name="connsiteX23" fmla="*/ 1197427 w 9676190"/>
+              <a:gd name="connsiteY23" fmla="*/ 4299857 h 5442857"/>
+              <a:gd name="connsiteX24" fmla="*/ 1153884 w 9676190"/>
+              <a:gd name="connsiteY24" fmla="*/ 4288971 h 5442857"/>
+              <a:gd name="connsiteX25" fmla="*/ 1088570 w 9676190"/>
+              <a:gd name="connsiteY25" fmla="*/ 4267200 h 5442857"/>
+              <a:gd name="connsiteX26" fmla="*/ 1023255 w 9676190"/>
+              <a:gd name="connsiteY26" fmla="*/ 4223657 h 5442857"/>
+              <a:gd name="connsiteX27" fmla="*/ 1001484 w 9676190"/>
+              <a:gd name="connsiteY27" fmla="*/ 4201885 h 5442857"/>
+              <a:gd name="connsiteX28" fmla="*/ 947055 w 9676190"/>
+              <a:gd name="connsiteY28" fmla="*/ 4191000 h 5442857"/>
+              <a:gd name="connsiteX29" fmla="*/ 903512 w 9676190"/>
+              <a:gd name="connsiteY29" fmla="*/ 4180114 h 5442857"/>
+              <a:gd name="connsiteX30" fmla="*/ 870855 w 9676190"/>
+              <a:gd name="connsiteY30" fmla="*/ 4158343 h 5442857"/>
+              <a:gd name="connsiteX31" fmla="*/ 805541 w 9676190"/>
+              <a:gd name="connsiteY31" fmla="*/ 4136571 h 5442857"/>
+              <a:gd name="connsiteX32" fmla="*/ 772884 w 9676190"/>
+              <a:gd name="connsiteY32" fmla="*/ 4125685 h 5442857"/>
+              <a:gd name="connsiteX33" fmla="*/ 707570 w 9676190"/>
+              <a:gd name="connsiteY33" fmla="*/ 4103914 h 5442857"/>
+              <a:gd name="connsiteX34" fmla="*/ 674912 w 9676190"/>
+              <a:gd name="connsiteY34" fmla="*/ 4093028 h 5442857"/>
+              <a:gd name="connsiteX35" fmla="*/ 631370 w 9676190"/>
+              <a:gd name="connsiteY35" fmla="*/ 4082143 h 5442857"/>
+              <a:gd name="connsiteX36" fmla="*/ 359227 w 9676190"/>
+              <a:gd name="connsiteY36" fmla="*/ 4093028 h 5442857"/>
+              <a:gd name="connsiteX37" fmla="*/ 293912 w 9676190"/>
+              <a:gd name="connsiteY37" fmla="*/ 4136571 h 5442857"/>
+              <a:gd name="connsiteX38" fmla="*/ 217712 w 9676190"/>
+              <a:gd name="connsiteY38" fmla="*/ 4158343 h 5442857"/>
+              <a:gd name="connsiteX39" fmla="*/ 185055 w 9676190"/>
+              <a:gd name="connsiteY39" fmla="*/ 4180114 h 5442857"/>
+              <a:gd name="connsiteX40" fmla="*/ 141512 w 9676190"/>
+              <a:gd name="connsiteY40" fmla="*/ 4201885 h 5442857"/>
+              <a:gd name="connsiteX41" fmla="*/ 119741 w 9676190"/>
+              <a:gd name="connsiteY41" fmla="*/ 4223657 h 5442857"/>
+              <a:gd name="connsiteX42" fmla="*/ 87084 w 9676190"/>
+              <a:gd name="connsiteY42" fmla="*/ 4234543 h 5442857"/>
+              <a:gd name="connsiteX43" fmla="*/ 10884 w 9676190"/>
+              <a:gd name="connsiteY43" fmla="*/ 4278085 h 5442857"/>
+              <a:gd name="connsiteX44" fmla="*/ 0 w 9676190"/>
+              <a:gd name="connsiteY44" fmla="*/ 4287781 h 5442857"/>
+            </a:gdLst>
+            <a:ahLst/>
+            <a:cxnLst>
+              <a:cxn ang="0">
+                <a:pos x="connsiteX0" y="connsiteY0"/>
+              </a:cxn>
+              <a:cxn ang="0">
+                <a:pos x="connsiteX1" y="connsiteY1"/>
+              </a:cxn>
+              <a:cxn ang="0">
+                <a:pos x="connsiteX2" y="connsiteY2"/>
+              </a:cxn>
+              <a:cxn ang="0">
+                <a:pos x="connsiteX3" y="connsiteY3"/>
+              </a:cxn>
+              <a:cxn ang="0">
+                <a:pos x="connsiteX4" y="connsiteY4"/>
+              </a:cxn>
+              <a:cxn ang="0">
+                <a:pos x="connsiteX5" y="connsiteY5"/>
+              </a:cxn>
+              <a:cxn ang="0">
+                <a:pos x="connsiteX6" y="connsiteY6"/>
+              </a:cxn>
+              <a:cxn ang="0">
+                <a:pos x="connsiteX7" y="connsiteY7"/>
+              </a:cxn>
+              <a:cxn ang="0">
+                <a:pos x="connsiteX8" y="connsiteY8"/>
+              </a:cxn>
+              <a:cxn ang="0">
+                <a:pos x="connsiteX9" y="connsiteY9"/>
+              </a:cxn>
+              <a:cxn ang="0">
+                <a:pos x="connsiteX10" y="connsiteY10"/>
+              </a:cxn>
+              <a:cxn ang="0">
+                <a:pos x="connsiteX11" y="connsiteY11"/>
+              </a:cxn>
+              <a:cxn ang="0">
+                <a:pos x="connsiteX12" y="connsiteY12"/>
+              </a:cxn>
+              <a:cxn ang="0">
+                <a:pos x="connsiteX13" y="connsiteY13"/>
+              </a:cxn>
+              <a:cxn ang="0">
+                <a:pos x="connsiteX14" y="connsiteY14"/>
+              </a:cxn>
+              <a:cxn ang="0">
+                <a:pos x="connsiteX15" y="connsiteY15"/>
+              </a:cxn>
+              <a:cxn ang="0">
+                <a:pos x="connsiteX16" y="connsiteY16"/>
+              </a:cxn>
+              <a:cxn ang="0">
+                <a:pos x="connsiteX17" y="connsiteY17"/>
+              </a:cxn>
+              <a:cxn ang="0">
+                <a:pos x="connsiteX18" y="connsiteY18"/>
+              </a:cxn>
+              <a:cxn ang="0">
+                <a:pos x="connsiteX19" y="connsiteY19"/>
+              </a:cxn>
+              <a:cxn ang="0">
+                <a:pos x="connsiteX20" y="connsiteY20"/>
+              </a:cxn>
+              <a:cxn ang="0">
+                <a:pos x="connsiteX21" y="connsiteY21"/>
+              </a:cxn>
+              <a:cxn ang="0">
+                <a:pos x="connsiteX22" y="connsiteY22"/>
+              </a:cxn>
+              <a:cxn ang="0">
+                <a:pos x="connsiteX23" y="connsiteY23"/>
+              </a:cxn>
+              <a:cxn ang="0">
+                <a:pos x="connsiteX24" y="connsiteY24"/>
+              </a:cxn>
+              <a:cxn ang="0">
+                <a:pos x="connsiteX25" y="connsiteY25"/>
+              </a:cxn>
+              <a:cxn ang="0">
+                <a:pos x="connsiteX26" y="connsiteY26"/>
+              </a:cxn>
+              <a:cxn ang="0">
+                <a:pos x="connsiteX27" y="connsiteY27"/>
+              </a:cxn>
+              <a:cxn ang="0">
+                <a:pos x="connsiteX28" y="connsiteY28"/>
+              </a:cxn>
+              <a:cxn ang="0">
+                <a:pos x="connsiteX29" y="connsiteY29"/>
+              </a:cxn>
+              <a:cxn ang="0">
+                <a:pos x="connsiteX30" y="connsiteY30"/>
+              </a:cxn>
+              <a:cxn ang="0">
+                <a:pos x="connsiteX31" y="connsiteY31"/>
+              </a:cxn>
+              <a:cxn ang="0">
+                <a:pos x="connsiteX32" y="connsiteY32"/>
+              </a:cxn>
+              <a:cxn ang="0">
+                <a:pos x="connsiteX33" y="connsiteY33"/>
+              </a:cxn>
+              <a:cxn ang="0">
+                <a:pos x="connsiteX34" y="connsiteY34"/>
+              </a:cxn>
+              <a:cxn ang="0">
+                <a:pos x="connsiteX35" y="connsiteY35"/>
+              </a:cxn>
+              <a:cxn ang="0">
+                <a:pos x="connsiteX36" y="connsiteY36"/>
+              </a:cxn>
+              <a:cxn ang="0">
+                <a:pos x="connsiteX37" y="connsiteY37"/>
+              </a:cxn>
+              <a:cxn ang="0">
+                <a:pos x="connsiteX38" y="connsiteY38"/>
+              </a:cxn>
+              <a:cxn ang="0">
+                <a:pos x="connsiteX39" y="connsiteY39"/>
+              </a:cxn>
+              <a:cxn ang="0">
+                <a:pos x="connsiteX40" y="connsiteY40"/>
+              </a:cxn>
+              <a:cxn ang="0">
+                <a:pos x="connsiteX41" y="connsiteY41"/>
+              </a:cxn>
+              <a:cxn ang="0">
+                <a:pos x="connsiteX42" y="connsiteY42"/>
+              </a:cxn>
+              <a:cxn ang="0">
+                <a:pos x="connsiteX43" y="connsiteY43"/>
+              </a:cxn>
+              <a:cxn ang="0">
+                <a:pos x="connsiteX44" y="connsiteY44"/>
+              </a:cxn>
+            </a:cxnLst>
+            <a:rect l="l" t="t" r="r" b="b"/>
+            <a:pathLst>
+              <a:path w="9676190" h="5442857">
+                <a:moveTo>
+                  <a:pt x="0" y="0"/>
+                </a:moveTo>
+                <a:lnTo>
+                  <a:pt x="9676190" y="0"/>
+                </a:lnTo>
+                <a:lnTo>
+                  <a:pt x="9676190" y="5442857"/>
+                </a:lnTo>
+                <a:lnTo>
+                  <a:pt x="1890711" y="5442857"/>
+                </a:lnTo>
+                <a:lnTo>
+                  <a:pt x="1883227" y="5203371"/>
+                </a:lnTo>
+                <a:cubicBezTo>
+                  <a:pt x="1882572" y="5191915"/>
+                  <a:pt x="1877473" y="5180977"/>
+                  <a:pt x="1872341" y="5170714"/>
+                </a:cubicBezTo>
+                <a:cubicBezTo>
+                  <a:pt x="1858608" y="5143249"/>
+                  <a:pt x="1849049" y="5136536"/>
+                  <a:pt x="1828798" y="5116285"/>
+                </a:cubicBezTo>
+                <a:cubicBezTo>
+                  <a:pt x="1791950" y="5005739"/>
+                  <a:pt x="1816272" y="5093911"/>
+                  <a:pt x="1796141" y="4953000"/>
+                </a:cubicBezTo>
+                <a:cubicBezTo>
+                  <a:pt x="1793524" y="4934684"/>
+                  <a:pt x="1814283" y="4916714"/>
+                  <a:pt x="1817912" y="4909457"/>
+                </a:cubicBezTo>
+                <a:cubicBezTo>
+                  <a:pt x="1792512" y="4869543"/>
+                  <a:pt x="1756672" y="4834597"/>
+                  <a:pt x="1741712" y="4789714"/>
+                </a:cubicBezTo>
+                <a:cubicBezTo>
+                  <a:pt x="1738084" y="4778828"/>
+                  <a:pt x="1735959" y="4767320"/>
+                  <a:pt x="1730827" y="4757057"/>
+                </a:cubicBezTo>
+                <a:cubicBezTo>
+                  <a:pt x="1717096" y="4729596"/>
+                  <a:pt x="1707532" y="4722877"/>
+                  <a:pt x="1687284" y="4702628"/>
+                </a:cubicBezTo>
+                <a:cubicBezTo>
+                  <a:pt x="1677462" y="4663342"/>
+                  <a:pt x="1671736" y="4619691"/>
+                  <a:pt x="1632855" y="4593771"/>
+                </a:cubicBezTo>
+                <a:cubicBezTo>
+                  <a:pt x="1621969" y="4586514"/>
+                  <a:pt x="1610414" y="4580173"/>
+                  <a:pt x="1600198" y="4572000"/>
+                </a:cubicBezTo>
+                <a:cubicBezTo>
+                  <a:pt x="1592184" y="4565589"/>
+                  <a:pt x="1584838" y="4558242"/>
+                  <a:pt x="1578427" y="4550228"/>
+                </a:cubicBezTo>
+                <a:cubicBezTo>
+                  <a:pt x="1570254" y="4540012"/>
+                  <a:pt x="1566871" y="4525744"/>
+                  <a:pt x="1556655" y="4517571"/>
+                </a:cubicBezTo>
+                <a:cubicBezTo>
+                  <a:pt x="1547695" y="4510403"/>
+                  <a:pt x="1534261" y="4511817"/>
+                  <a:pt x="1523998" y="4506685"/>
+                </a:cubicBezTo>
+                <a:cubicBezTo>
+                  <a:pt x="1512296" y="4500834"/>
+                  <a:pt x="1503043" y="4490765"/>
+                  <a:pt x="1491341" y="4484914"/>
+                </a:cubicBezTo>
+                <a:cubicBezTo>
+                  <a:pt x="1475720" y="4477104"/>
+                  <a:pt x="1429098" y="4466632"/>
+                  <a:pt x="1415141" y="4463143"/>
+                </a:cubicBezTo>
+                <a:lnTo>
+                  <a:pt x="1349827" y="4397828"/>
+                </a:lnTo>
+                <a:cubicBezTo>
+                  <a:pt x="1342570" y="4390571"/>
+                  <a:pt x="1336594" y="4381750"/>
+                  <a:pt x="1328055" y="4376057"/>
+                </a:cubicBezTo>
+                <a:cubicBezTo>
+                  <a:pt x="1317169" y="4368800"/>
+                  <a:pt x="1305449" y="4362661"/>
+                  <a:pt x="1295398" y="4354285"/>
+                </a:cubicBezTo>
+                <a:cubicBezTo>
+                  <a:pt x="1283572" y="4344430"/>
+                  <a:pt x="1276198" y="4329104"/>
+                  <a:pt x="1262741" y="4321628"/>
+                </a:cubicBezTo>
+                <a:cubicBezTo>
+                  <a:pt x="1242680" y="4310483"/>
+                  <a:pt x="1219691" y="4305423"/>
+                  <a:pt x="1197427" y="4299857"/>
+                </a:cubicBezTo>
+                <a:cubicBezTo>
+                  <a:pt x="1182913" y="4296228"/>
+                  <a:pt x="1168214" y="4293270"/>
+                  <a:pt x="1153884" y="4288971"/>
+                </a:cubicBezTo>
+                <a:cubicBezTo>
+                  <a:pt x="1131903" y="4282377"/>
+                  <a:pt x="1088570" y="4267200"/>
+                  <a:pt x="1088570" y="4267200"/>
+                </a:cubicBezTo>
+                <a:cubicBezTo>
+                  <a:pt x="1066798" y="4252686"/>
+                  <a:pt x="1041757" y="4242160"/>
+                  <a:pt x="1023255" y="4223657"/>
+                </a:cubicBezTo>
+                <a:cubicBezTo>
+                  <a:pt x="1015998" y="4216400"/>
+                  <a:pt x="1010917" y="4205928"/>
+                  <a:pt x="1001484" y="4201885"/>
+                </a:cubicBezTo>
+                <a:cubicBezTo>
+                  <a:pt x="984478" y="4194597"/>
+                  <a:pt x="965117" y="4195014"/>
+                  <a:pt x="947055" y="4191000"/>
+                </a:cubicBezTo>
+                <a:cubicBezTo>
+                  <a:pt x="932450" y="4187755"/>
+                  <a:pt x="918026" y="4183743"/>
+                  <a:pt x="903512" y="4180114"/>
+                </a:cubicBezTo>
+                <a:cubicBezTo>
+                  <a:pt x="892626" y="4172857"/>
+                  <a:pt x="882810" y="4163656"/>
+                  <a:pt x="870855" y="4158343"/>
+                </a:cubicBezTo>
+                <a:cubicBezTo>
+                  <a:pt x="849884" y="4149022"/>
+                  <a:pt x="827312" y="4143828"/>
+                  <a:pt x="805541" y="4136571"/>
+                </a:cubicBezTo>
+                <a:lnTo>
+                  <a:pt x="772884" y="4125685"/>
+                </a:lnTo>
+                <a:lnTo>
+                  <a:pt x="707570" y="4103914"/>
+                </a:lnTo>
+                <a:cubicBezTo>
+                  <a:pt x="696684" y="4100285"/>
+                  <a:pt x="686044" y="4095811"/>
+                  <a:pt x="674912" y="4093028"/>
+                </a:cubicBezTo>
+                <a:lnTo>
+                  <a:pt x="631370" y="4082143"/>
+                </a:lnTo>
+                <a:cubicBezTo>
+                  <a:pt x="540656" y="4085771"/>
+                  <a:pt x="448856" y="4078572"/>
+                  <a:pt x="359227" y="4093028"/>
+                </a:cubicBezTo>
+                <a:cubicBezTo>
+                  <a:pt x="333395" y="4097194"/>
+                  <a:pt x="318735" y="4128296"/>
+                  <a:pt x="293912" y="4136571"/>
+                </a:cubicBezTo>
+                <a:cubicBezTo>
+                  <a:pt x="247062" y="4152188"/>
+                  <a:pt x="272387" y="4144674"/>
+                  <a:pt x="217712" y="4158343"/>
+                </a:cubicBezTo>
+                <a:cubicBezTo>
+                  <a:pt x="206826" y="4165600"/>
+                  <a:pt x="196414" y="4173623"/>
+                  <a:pt x="185055" y="4180114"/>
+                </a:cubicBezTo>
+                <a:cubicBezTo>
+                  <a:pt x="170966" y="4188165"/>
+                  <a:pt x="155014" y="4192884"/>
+                  <a:pt x="141512" y="4201885"/>
+                </a:cubicBezTo>
+                <a:cubicBezTo>
+                  <a:pt x="132973" y="4207578"/>
+                  <a:pt x="128542" y="4218376"/>
+                  <a:pt x="119741" y="4223657"/>
+                </a:cubicBezTo>
+                <a:cubicBezTo>
+                  <a:pt x="109902" y="4229561"/>
+                  <a:pt x="97631" y="4230023"/>
+                  <a:pt x="87084" y="4234543"/>
+                </a:cubicBezTo>
+                <a:cubicBezTo>
+                  <a:pt x="63016" y="4244858"/>
+                  <a:pt x="31908" y="4261266"/>
+                  <a:pt x="10884" y="4278085"/>
+                </a:cubicBezTo>
+                <a:lnTo>
+                  <a:pt x="0" y="4287781"/>
+                </a:lnTo>
+                <a:close/>
+              </a:path>
+            </a:pathLst>
+          </a:custGeom>
+        </p:spPr>
+      </p:pic>
+      <p:pic>
+        <p:nvPicPr>
+          <p:cNvPr id="56" name="Picture 13">
+            <a:extLst>
+              <a:ext uri="{FF2B5EF4-FFF2-40B4-BE49-F238E27FC236}">
+                <a16:creationId xmlns:a16="http://schemas.microsoft.com/office/drawing/2014/main" id="{94164FB2-EFB1-4531-A8F4-DD77A03E2CCB}"/>
+              </a:ext>
+              <a:ext uri="{C183D7F6-B498-43B3-948B-1728B52AA6E4}">
+                <adec:decorative xmlns:adec="http://schemas.microsoft.com/office/drawing/2017/decorative" val="1"/>
+              </a:ext>
+            </a:extLst>
+          </p:cNvPr>
+          <p:cNvPicPr>
+            <a:picLocks noGrp="1" noRot="1" noChangeAspect="1" noMove="1" noResize="1" noEditPoints="1" noAdjustHandles="1" noChangeArrowheads="1" noChangeShapeType="1" noCrop="1"/>
+          </p:cNvPicPr>
+          <p:nvPr>
+            <p:extLst>
+              <p:ext uri="{386F3935-93C4-4BCD-93E2-E3B085C9AB24}">
+                <p16:designElem xmlns:p16="http://schemas.microsoft.com/office/powerpoint/2015/main" val="1"/>
+              </p:ext>
+            </p:extLst>
+          </p:nvPr>
+        </p:nvPicPr>
+        <p:blipFill rotWithShape="1">
+          <a:blip r:embed="rId4">
+            <a:extLst>
+              <a:ext uri="{28A0092B-C50C-407E-A947-70E740481C1C}">
+                <a14:useLocalDpi xmlns:a14="http://schemas.microsoft.com/office/drawing/2010/main" val="0"/>
+              </a:ext>
+            </a:extLst>
+          </a:blip>
+          <a:srcRect t="72342" r="78777"/>
+          <a:stretch/>
+        </p:blipFill>
+        <p:spPr>
+          <a:xfrm>
+            <a:off x="0" y="4871698"/>
+            <a:ext cx="1540175" cy="1129052"/>
+          </a:xfrm>
+          <a:custGeom>
+            <a:avLst/>
+            <a:gdLst>
+              <a:gd name="connsiteX0" fmla="*/ 1355645 w 2053566"/>
+              <a:gd name="connsiteY0" fmla="*/ 0 h 1505403"/>
+              <a:gd name="connsiteX1" fmla="*/ 2053566 w 2053566"/>
+              <a:gd name="connsiteY1" fmla="*/ 0 h 1505403"/>
+              <a:gd name="connsiteX2" fmla="*/ 2053566 w 2053566"/>
+              <a:gd name="connsiteY2" fmla="*/ 500084 h 1505403"/>
+              <a:gd name="connsiteX3" fmla="*/ 2046514 w 2053566"/>
+              <a:gd name="connsiteY3" fmla="*/ 493032 h 1505403"/>
+              <a:gd name="connsiteX4" fmla="*/ 2002971 w 2053566"/>
+              <a:gd name="connsiteY4" fmla="*/ 438603 h 1505403"/>
+              <a:gd name="connsiteX5" fmla="*/ 1970314 w 2053566"/>
+              <a:gd name="connsiteY5" fmla="*/ 416832 h 1505403"/>
+              <a:gd name="connsiteX6" fmla="*/ 1926771 w 2053566"/>
+              <a:gd name="connsiteY6" fmla="*/ 373289 h 1505403"/>
+              <a:gd name="connsiteX7" fmla="*/ 1905000 w 2053566"/>
+              <a:gd name="connsiteY7" fmla="*/ 351517 h 1505403"/>
+              <a:gd name="connsiteX8" fmla="*/ 1839686 w 2053566"/>
+              <a:gd name="connsiteY8" fmla="*/ 307974 h 1505403"/>
+              <a:gd name="connsiteX9" fmla="*/ 1774371 w 2053566"/>
+              <a:gd name="connsiteY9" fmla="*/ 286203 h 1505403"/>
+              <a:gd name="connsiteX10" fmla="*/ 1741714 w 2053566"/>
+              <a:gd name="connsiteY10" fmla="*/ 264432 h 1505403"/>
+              <a:gd name="connsiteX11" fmla="*/ 1676400 w 2053566"/>
+              <a:gd name="connsiteY11" fmla="*/ 242660 h 1505403"/>
+              <a:gd name="connsiteX12" fmla="*/ 1643743 w 2053566"/>
+              <a:gd name="connsiteY12" fmla="*/ 210003 h 1505403"/>
+              <a:gd name="connsiteX13" fmla="*/ 1600200 w 2053566"/>
+              <a:gd name="connsiteY13" fmla="*/ 199117 h 1505403"/>
+              <a:gd name="connsiteX14" fmla="*/ 1578429 w 2053566"/>
+              <a:gd name="connsiteY14" fmla="*/ 155574 h 1505403"/>
+              <a:gd name="connsiteX15" fmla="*/ 1502229 w 2053566"/>
+              <a:gd name="connsiteY15" fmla="*/ 90260 h 1505403"/>
+              <a:gd name="connsiteX16" fmla="*/ 1436914 w 2053566"/>
+              <a:gd name="connsiteY16" fmla="*/ 46717 h 1505403"/>
+              <a:gd name="connsiteX17" fmla="*/ 1404257 w 2053566"/>
+              <a:gd name="connsiteY17" fmla="*/ 24946 h 1505403"/>
+              <a:gd name="connsiteX18" fmla="*/ 1360714 w 2053566"/>
+              <a:gd name="connsiteY18" fmla="*/ 3174 h 1505403"/>
+              <a:gd name="connsiteX19" fmla="*/ 0 w 2053566"/>
+              <a:gd name="connsiteY19" fmla="*/ 0 h 1505403"/>
+              <a:gd name="connsiteX20" fmla="*/ 614898 w 2053566"/>
+              <a:gd name="connsiteY20" fmla="*/ 0 h 1505403"/>
+              <a:gd name="connsiteX21" fmla="*/ 620486 w 2053566"/>
+              <a:gd name="connsiteY21" fmla="*/ 35832 h 1505403"/>
+              <a:gd name="connsiteX22" fmla="*/ 685800 w 2053566"/>
+              <a:gd name="connsiteY22" fmla="*/ 101146 h 1505403"/>
+              <a:gd name="connsiteX23" fmla="*/ 718457 w 2053566"/>
+              <a:gd name="connsiteY23" fmla="*/ 122917 h 1505403"/>
+              <a:gd name="connsiteX24" fmla="*/ 762000 w 2053566"/>
+              <a:gd name="connsiteY24" fmla="*/ 133803 h 1505403"/>
+              <a:gd name="connsiteX25" fmla="*/ 794657 w 2053566"/>
+              <a:gd name="connsiteY25" fmla="*/ 144689 h 1505403"/>
+              <a:gd name="connsiteX26" fmla="*/ 838200 w 2053566"/>
+              <a:gd name="connsiteY26" fmla="*/ 155574 h 1505403"/>
+              <a:gd name="connsiteX27" fmla="*/ 903514 w 2053566"/>
+              <a:gd name="connsiteY27" fmla="*/ 177346 h 1505403"/>
+              <a:gd name="connsiteX28" fmla="*/ 968829 w 2053566"/>
+              <a:gd name="connsiteY28" fmla="*/ 210003 h 1505403"/>
+              <a:gd name="connsiteX29" fmla="*/ 1012371 w 2053566"/>
+              <a:gd name="connsiteY29" fmla="*/ 242660 h 1505403"/>
+              <a:gd name="connsiteX30" fmla="*/ 1045029 w 2053566"/>
+              <a:gd name="connsiteY30" fmla="*/ 253546 h 1505403"/>
+              <a:gd name="connsiteX31" fmla="*/ 1077686 w 2053566"/>
+              <a:gd name="connsiteY31" fmla="*/ 286203 h 1505403"/>
+              <a:gd name="connsiteX32" fmla="*/ 1110343 w 2053566"/>
+              <a:gd name="connsiteY32" fmla="*/ 297089 h 1505403"/>
+              <a:gd name="connsiteX33" fmla="*/ 1175657 w 2053566"/>
+              <a:gd name="connsiteY33" fmla="*/ 340632 h 1505403"/>
+              <a:gd name="connsiteX34" fmla="*/ 1208314 w 2053566"/>
+              <a:gd name="connsiteY34" fmla="*/ 362403 h 1505403"/>
+              <a:gd name="connsiteX35" fmla="*/ 1284514 w 2053566"/>
+              <a:gd name="connsiteY35" fmla="*/ 384174 h 1505403"/>
+              <a:gd name="connsiteX36" fmla="*/ 1317171 w 2053566"/>
+              <a:gd name="connsiteY36" fmla="*/ 405946 h 1505403"/>
+              <a:gd name="connsiteX37" fmla="*/ 1382486 w 2053566"/>
+              <a:gd name="connsiteY37" fmla="*/ 427717 h 1505403"/>
+              <a:gd name="connsiteX38" fmla="*/ 1436914 w 2053566"/>
+              <a:gd name="connsiteY38" fmla="*/ 471260 h 1505403"/>
+              <a:gd name="connsiteX39" fmla="*/ 1458686 w 2053566"/>
+              <a:gd name="connsiteY39" fmla="*/ 493032 h 1505403"/>
+              <a:gd name="connsiteX40" fmla="*/ 1524000 w 2053566"/>
+              <a:gd name="connsiteY40" fmla="*/ 514803 h 1505403"/>
+              <a:gd name="connsiteX41" fmla="*/ 1578429 w 2053566"/>
+              <a:gd name="connsiteY41" fmla="*/ 569232 h 1505403"/>
+              <a:gd name="connsiteX42" fmla="*/ 1611086 w 2053566"/>
+              <a:gd name="connsiteY42" fmla="*/ 601889 h 1505403"/>
+              <a:gd name="connsiteX43" fmla="*/ 1687286 w 2053566"/>
+              <a:gd name="connsiteY43" fmla="*/ 667203 h 1505403"/>
+              <a:gd name="connsiteX44" fmla="*/ 1763486 w 2053566"/>
+              <a:gd name="connsiteY44" fmla="*/ 743403 h 1505403"/>
+              <a:gd name="connsiteX45" fmla="*/ 1796143 w 2053566"/>
+              <a:gd name="connsiteY45" fmla="*/ 776060 h 1505403"/>
+              <a:gd name="connsiteX46" fmla="*/ 1817914 w 2053566"/>
+              <a:gd name="connsiteY46" fmla="*/ 797832 h 1505403"/>
+              <a:gd name="connsiteX47" fmla="*/ 1883229 w 2053566"/>
+              <a:gd name="connsiteY47" fmla="*/ 841374 h 1505403"/>
+              <a:gd name="connsiteX48" fmla="*/ 1915886 w 2053566"/>
+              <a:gd name="connsiteY48" fmla="*/ 863146 h 1505403"/>
+              <a:gd name="connsiteX49" fmla="*/ 1948543 w 2053566"/>
+              <a:gd name="connsiteY49" fmla="*/ 895803 h 1505403"/>
+              <a:gd name="connsiteX50" fmla="*/ 1992086 w 2053566"/>
+              <a:gd name="connsiteY50" fmla="*/ 906689 h 1505403"/>
+              <a:gd name="connsiteX51" fmla="*/ 2024743 w 2053566"/>
+              <a:gd name="connsiteY51" fmla="*/ 917574 h 1505403"/>
+              <a:gd name="connsiteX52" fmla="*/ 2053566 w 2053566"/>
+              <a:gd name="connsiteY52" fmla="*/ 925251 h 1505403"/>
+              <a:gd name="connsiteX53" fmla="*/ 2053566 w 2053566"/>
+              <a:gd name="connsiteY53" fmla="*/ 1505403 h 1505403"/>
+              <a:gd name="connsiteX54" fmla="*/ 0 w 2053566"/>
+              <a:gd name="connsiteY54" fmla="*/ 1505403 h 1505403"/>
+            </a:gdLst>
+            <a:ahLst/>
+            <a:cxnLst>
+              <a:cxn ang="0">
+                <a:pos x="connsiteX0" y="connsiteY0"/>
+              </a:cxn>
+              <a:cxn ang="0">
+                <a:pos x="connsiteX1" y="connsiteY1"/>
+              </a:cxn>
+              <a:cxn ang="0">
+                <a:pos x="connsiteX2" y="connsiteY2"/>
+              </a:cxn>
+              <a:cxn ang="0">
+                <a:pos x="connsiteX3" y="connsiteY3"/>
+              </a:cxn>
+              <a:cxn ang="0">
+                <a:pos x="connsiteX4" y="connsiteY4"/>
+              </a:cxn>
+              <a:cxn ang="0">
+                <a:pos x="connsiteX5" y="connsiteY5"/>
+              </a:cxn>
+              <a:cxn ang="0">
+                <a:pos x="connsiteX6" y="connsiteY6"/>
+              </a:cxn>
+              <a:cxn ang="0">
+                <a:pos x="connsiteX7" y="connsiteY7"/>
+              </a:cxn>
+              <a:cxn ang="0">
+                <a:pos x="connsiteX8" y="connsiteY8"/>
+              </a:cxn>
+              <a:cxn ang="0">
+                <a:pos x="connsiteX9" y="connsiteY9"/>
+              </a:cxn>
+              <a:cxn ang="0">
+                <a:pos x="connsiteX10" y="connsiteY10"/>
+              </a:cxn>
+              <a:cxn ang="0">
+                <a:pos x="connsiteX11" y="connsiteY11"/>
+              </a:cxn>
+              <a:cxn ang="0">
+                <a:pos x="connsiteX12" y="connsiteY12"/>
+              </a:cxn>
+              <a:cxn ang="0">
+                <a:pos x="connsiteX13" y="connsiteY13"/>
+              </a:cxn>
+              <a:cxn ang="0">
+                <a:pos x="connsiteX14" y="connsiteY14"/>
+              </a:cxn>
+              <a:cxn ang="0">
+                <a:pos x="connsiteX15" y="connsiteY15"/>
+              </a:cxn>
+              <a:cxn ang="0">
+                <a:pos x="connsiteX16" y="connsiteY16"/>
+              </a:cxn>
+              <a:cxn ang="0">
+                <a:pos x="connsiteX17" y="connsiteY17"/>
+              </a:cxn>
+              <a:cxn ang="0">
+                <a:pos x="connsiteX18" y="connsiteY18"/>
+              </a:cxn>
+              <a:cxn ang="0">
+                <a:pos x="connsiteX19" y="connsiteY19"/>
+              </a:cxn>
+              <a:cxn ang="0">
+                <a:pos x="connsiteX20" y="connsiteY20"/>
+              </a:cxn>
+              <a:cxn ang="0">
+                <a:pos x="connsiteX21" y="connsiteY21"/>
+              </a:cxn>
+              <a:cxn ang="0">
+                <a:pos x="connsiteX22" y="connsiteY22"/>
+              </a:cxn>
+              <a:cxn ang="0">
+                <a:pos x="connsiteX23" y="connsiteY23"/>
+              </a:cxn>
+              <a:cxn ang="0">
+                <a:pos x="connsiteX24" y="connsiteY24"/>
+              </a:cxn>
+              <a:cxn ang="0">
+                <a:pos x="connsiteX25" y="connsiteY25"/>
+              </a:cxn>
+              <a:cxn ang="0">
+                <a:pos x="connsiteX26" y="connsiteY26"/>
+              </a:cxn>
+              <a:cxn ang="0">
+                <a:pos x="connsiteX27" y="connsiteY27"/>
+              </a:cxn>
+              <a:cxn ang="0">
+                <a:pos x="connsiteX28" y="connsiteY28"/>
+              </a:cxn>
+              <a:cxn ang="0">
+                <a:pos x="connsiteX29" y="connsiteY29"/>
+              </a:cxn>
+              <a:cxn ang="0">
+                <a:pos x="connsiteX30" y="connsiteY30"/>
+              </a:cxn>
+              <a:cxn ang="0">
+                <a:pos x="connsiteX31" y="connsiteY31"/>
+              </a:cxn>
+              <a:cxn ang="0">
+                <a:pos x="connsiteX32" y="connsiteY32"/>
+              </a:cxn>
+              <a:cxn ang="0">
+                <a:pos x="connsiteX33" y="connsiteY33"/>
+              </a:cxn>
+              <a:cxn ang="0">
+                <a:pos x="connsiteX34" y="connsiteY34"/>
+              </a:cxn>
+              <a:cxn ang="0">
+                <a:pos x="connsiteX35" y="connsiteY35"/>
+              </a:cxn>
+              <a:cxn ang="0">
+                <a:pos x="connsiteX36" y="connsiteY36"/>
+              </a:cxn>
+              <a:cxn ang="0">
+                <a:pos x="connsiteX37" y="connsiteY37"/>
+              </a:cxn>
+              <a:cxn ang="0">
+                <a:pos x="connsiteX38" y="connsiteY38"/>
+              </a:cxn>
+              <a:cxn ang="0">
+                <a:pos x="connsiteX39" y="connsiteY39"/>
+              </a:cxn>
+              <a:cxn ang="0">
+                <a:pos x="connsiteX40" y="connsiteY40"/>
+              </a:cxn>
+              <a:cxn ang="0">
+                <a:pos x="connsiteX41" y="connsiteY41"/>
+              </a:cxn>
+              <a:cxn ang="0">
+                <a:pos x="connsiteX42" y="connsiteY42"/>
+              </a:cxn>
+              <a:cxn ang="0">
+                <a:pos x="connsiteX43" y="connsiteY43"/>
+              </a:cxn>
+              <a:cxn ang="0">
+                <a:pos x="connsiteX44" y="connsiteY44"/>
+              </a:cxn>
+              <a:cxn ang="0">
+                <a:pos x="connsiteX45" y="connsiteY45"/>
+              </a:cxn>
+              <a:cxn ang="0">
+                <a:pos x="connsiteX46" y="connsiteY46"/>
+              </a:cxn>
+              <a:cxn ang="0">
+                <a:pos x="connsiteX47" y="connsiteY47"/>
+              </a:cxn>
+              <a:cxn ang="0">
+                <a:pos x="connsiteX48" y="connsiteY48"/>
+              </a:cxn>
+              <a:cxn ang="0">
+                <a:pos x="connsiteX49" y="connsiteY49"/>
+              </a:cxn>
+              <a:cxn ang="0">
+                <a:pos x="connsiteX50" y="connsiteY50"/>
+              </a:cxn>
+              <a:cxn ang="0">
+                <a:pos x="connsiteX51" y="connsiteY51"/>
+              </a:cxn>
+              <a:cxn ang="0">
+                <a:pos x="connsiteX52" y="connsiteY52"/>
+              </a:cxn>
+              <a:cxn ang="0">
+                <a:pos x="connsiteX53" y="connsiteY53"/>
+              </a:cxn>
+              <a:cxn ang="0">
+                <a:pos x="connsiteX54" y="connsiteY54"/>
+              </a:cxn>
+            </a:cxnLst>
+            <a:rect l="l" t="t" r="r" b="b"/>
+            <a:pathLst>
+              <a:path w="2053566" h="1505403">
+                <a:moveTo>
+                  <a:pt x="1355645" y="0"/>
+                </a:moveTo>
+                <a:lnTo>
+                  <a:pt x="2053566" y="0"/>
+                </a:lnTo>
+                <a:lnTo>
+                  <a:pt x="2053566" y="500084"/>
+                </a:lnTo>
+                <a:lnTo>
+                  <a:pt x="2046514" y="493032"/>
+                </a:lnTo>
+                <a:cubicBezTo>
+                  <a:pt x="2021363" y="461593"/>
+                  <a:pt x="2032180" y="461970"/>
+                  <a:pt x="2002971" y="438603"/>
+                </a:cubicBezTo>
+                <a:cubicBezTo>
+                  <a:pt x="1992755" y="430430"/>
+                  <a:pt x="1980247" y="425346"/>
+                  <a:pt x="1970314" y="416832"/>
+                </a:cubicBezTo>
+                <a:cubicBezTo>
+                  <a:pt x="1954729" y="403474"/>
+                  <a:pt x="1941285" y="387803"/>
+                  <a:pt x="1926771" y="373289"/>
+                </a:cubicBezTo>
+                <a:cubicBezTo>
+                  <a:pt x="1919514" y="366032"/>
+                  <a:pt x="1913539" y="357210"/>
+                  <a:pt x="1905000" y="351517"/>
+                </a:cubicBezTo>
+                <a:cubicBezTo>
+                  <a:pt x="1883229" y="337003"/>
+                  <a:pt x="1864509" y="316248"/>
+                  <a:pt x="1839686" y="307974"/>
+                </a:cubicBezTo>
+                <a:cubicBezTo>
+                  <a:pt x="1817914" y="300717"/>
+                  <a:pt x="1793466" y="298933"/>
+                  <a:pt x="1774371" y="286203"/>
+                </a:cubicBezTo>
+                <a:cubicBezTo>
+                  <a:pt x="1763485" y="278946"/>
+                  <a:pt x="1753669" y="269745"/>
+                  <a:pt x="1741714" y="264432"/>
+                </a:cubicBezTo>
+                <a:cubicBezTo>
+                  <a:pt x="1720743" y="255111"/>
+                  <a:pt x="1676400" y="242660"/>
+                  <a:pt x="1676400" y="242660"/>
+                </a:cubicBezTo>
+                <a:cubicBezTo>
+                  <a:pt x="1665514" y="231774"/>
+                  <a:pt x="1657109" y="217641"/>
+                  <a:pt x="1643743" y="210003"/>
+                </a:cubicBezTo>
+                <a:cubicBezTo>
+                  <a:pt x="1630753" y="202580"/>
+                  <a:pt x="1614393" y="203848"/>
+                  <a:pt x="1600200" y="199117"/>
+                </a:cubicBezTo>
+                <a:cubicBezTo>
+                  <a:pt x="1592503" y="196551"/>
+                  <a:pt x="1582058" y="162831"/>
+                  <a:pt x="1578429" y="155574"/>
+                </a:cubicBezTo>
+                <a:cubicBezTo>
+                  <a:pt x="1553029" y="133803"/>
+                  <a:pt x="1528745" y="110657"/>
+                  <a:pt x="1502229" y="90260"/>
+                </a:cubicBezTo>
+                <a:cubicBezTo>
+                  <a:pt x="1481489" y="74306"/>
+                  <a:pt x="1458686" y="61231"/>
+                  <a:pt x="1436914" y="46717"/>
+                </a:cubicBezTo>
+                <a:cubicBezTo>
+                  <a:pt x="1426028" y="39460"/>
+                  <a:pt x="1415959" y="30797"/>
+                  <a:pt x="1404257" y="24946"/>
+                </a:cubicBezTo>
+                <a:cubicBezTo>
+                  <a:pt x="1389743" y="17689"/>
+                  <a:pt x="1374803" y="11225"/>
+                  <a:pt x="1360714" y="3174"/>
+                </a:cubicBezTo>
+                <a:close/>
+                <a:moveTo>
+                  <a:pt x="0" y="0"/>
+                </a:moveTo>
+                <a:lnTo>
+                  <a:pt x="614898" y="0"/>
+                </a:lnTo>
+                <a:lnTo>
+                  <a:pt x="620486" y="35832"/>
+                </a:lnTo>
+                <a:cubicBezTo>
+                  <a:pt x="631645" y="64528"/>
+                  <a:pt x="660182" y="84067"/>
+                  <a:pt x="685800" y="101146"/>
+                </a:cubicBezTo>
+                <a:cubicBezTo>
+                  <a:pt x="696686" y="108403"/>
+                  <a:pt x="706432" y="117763"/>
+                  <a:pt x="718457" y="122917"/>
+                </a:cubicBezTo>
+                <a:cubicBezTo>
+                  <a:pt x="732208" y="128810"/>
+                  <a:pt x="747615" y="129693"/>
+                  <a:pt x="762000" y="133803"/>
+                </a:cubicBezTo>
+                <a:cubicBezTo>
+                  <a:pt x="773033" y="136955"/>
+                  <a:pt x="783624" y="141537"/>
+                  <a:pt x="794657" y="144689"/>
+                </a:cubicBezTo>
+                <a:cubicBezTo>
+                  <a:pt x="809042" y="148799"/>
+                  <a:pt x="823870" y="151275"/>
+                  <a:pt x="838200" y="155574"/>
+                </a:cubicBezTo>
+                <a:cubicBezTo>
+                  <a:pt x="860181" y="162168"/>
+                  <a:pt x="884419" y="164616"/>
+                  <a:pt x="903514" y="177346"/>
+                </a:cubicBezTo>
+                <a:cubicBezTo>
+                  <a:pt x="945719" y="205482"/>
+                  <a:pt x="923759" y="194980"/>
+                  <a:pt x="968829" y="210003"/>
+                </a:cubicBezTo>
+                <a:cubicBezTo>
+                  <a:pt x="983343" y="220889"/>
+                  <a:pt x="996619" y="233659"/>
+                  <a:pt x="1012371" y="242660"/>
+                </a:cubicBezTo>
+                <a:cubicBezTo>
+                  <a:pt x="1022334" y="248353"/>
+                  <a:pt x="1035481" y="247181"/>
+                  <a:pt x="1045029" y="253546"/>
+                </a:cubicBezTo>
+                <a:cubicBezTo>
+                  <a:pt x="1057838" y="262085"/>
+                  <a:pt x="1064877" y="277664"/>
+                  <a:pt x="1077686" y="286203"/>
+                </a:cubicBezTo>
+                <a:cubicBezTo>
+                  <a:pt x="1087233" y="292568"/>
+                  <a:pt x="1100312" y="291516"/>
+                  <a:pt x="1110343" y="297089"/>
+                </a:cubicBezTo>
+                <a:cubicBezTo>
+                  <a:pt x="1133216" y="309796"/>
+                  <a:pt x="1153886" y="326118"/>
+                  <a:pt x="1175657" y="340632"/>
+                </a:cubicBezTo>
+                <a:cubicBezTo>
+                  <a:pt x="1186543" y="347889"/>
+                  <a:pt x="1195622" y="359230"/>
+                  <a:pt x="1208314" y="362403"/>
+                </a:cubicBezTo>
+                <a:cubicBezTo>
+                  <a:pt x="1262989" y="376072"/>
+                  <a:pt x="1237664" y="368558"/>
+                  <a:pt x="1284514" y="384174"/>
+                </a:cubicBezTo>
+                <a:cubicBezTo>
+                  <a:pt x="1295400" y="391431"/>
+                  <a:pt x="1305216" y="400632"/>
+                  <a:pt x="1317171" y="405946"/>
+                </a:cubicBezTo>
+                <a:cubicBezTo>
+                  <a:pt x="1338142" y="415267"/>
+                  <a:pt x="1382486" y="427717"/>
+                  <a:pt x="1382486" y="427717"/>
+                </a:cubicBezTo>
+                <a:cubicBezTo>
+                  <a:pt x="1435049" y="480282"/>
+                  <a:pt x="1368259" y="416336"/>
+                  <a:pt x="1436914" y="471260"/>
+                </a:cubicBezTo>
+                <a:cubicBezTo>
+                  <a:pt x="1444928" y="477671"/>
+                  <a:pt x="1449506" y="488442"/>
+                  <a:pt x="1458686" y="493032"/>
+                </a:cubicBezTo>
+                <a:cubicBezTo>
+                  <a:pt x="1479212" y="503295"/>
+                  <a:pt x="1524000" y="514803"/>
+                  <a:pt x="1524000" y="514803"/>
+                </a:cubicBezTo>
+                <a:lnTo>
+                  <a:pt x="1578429" y="569232"/>
+                </a:lnTo>
+                <a:cubicBezTo>
+                  <a:pt x="1589315" y="580118"/>
+                  <a:pt x="1598277" y="593350"/>
+                  <a:pt x="1611086" y="601889"/>
+                </a:cubicBezTo>
+                <a:cubicBezTo>
+                  <a:pt x="1660822" y="635046"/>
+                  <a:pt x="1634492" y="614409"/>
+                  <a:pt x="1687286" y="667203"/>
+                </a:cubicBezTo>
+                <a:lnTo>
+                  <a:pt x="1763486" y="743403"/>
+                </a:lnTo>
+                <a:lnTo>
+                  <a:pt x="1796143" y="776060"/>
+                </a:lnTo>
+                <a:cubicBezTo>
+                  <a:pt x="1803400" y="783317"/>
+                  <a:pt x="1809374" y="792139"/>
+                  <a:pt x="1817914" y="797832"/>
+                </a:cubicBezTo>
+                <a:lnTo>
+                  <a:pt x="1883229" y="841374"/>
+                </a:lnTo>
+                <a:cubicBezTo>
+                  <a:pt x="1894115" y="848631"/>
+                  <a:pt x="1906635" y="853895"/>
+                  <a:pt x="1915886" y="863146"/>
+                </a:cubicBezTo>
+                <a:cubicBezTo>
+                  <a:pt x="1926772" y="874032"/>
+                  <a:pt x="1935177" y="888165"/>
+                  <a:pt x="1948543" y="895803"/>
+                </a:cubicBezTo>
+                <a:cubicBezTo>
+                  <a:pt x="1961533" y="903226"/>
+                  <a:pt x="1977701" y="902579"/>
+                  <a:pt x="1992086" y="906689"/>
+                </a:cubicBezTo>
+                <a:cubicBezTo>
+                  <a:pt x="2003119" y="909841"/>
+                  <a:pt x="2013673" y="914555"/>
+                  <a:pt x="2024743" y="917574"/>
+                </a:cubicBezTo>
+                <a:lnTo>
+                  <a:pt x="2053566" y="925251"/>
+                </a:lnTo>
+                <a:lnTo>
+                  <a:pt x="2053566" y="1505403"/>
+                </a:lnTo>
+                <a:lnTo>
+                  <a:pt x="0" y="1505403"/>
+                </a:lnTo>
+                <a:close/>
+              </a:path>
+            </a:pathLst>
+          </a:custGeom>
+        </p:spPr>
+      </p:pic>
+      <p:pic>
+        <p:nvPicPr>
+          <p:cNvPr id="57" name="Picture 15">
+            <a:extLst>
+              <a:ext uri="{FF2B5EF4-FFF2-40B4-BE49-F238E27FC236}">
+                <a16:creationId xmlns:a16="http://schemas.microsoft.com/office/drawing/2014/main" id="{0E6BC652-4BE1-478A-BFA7-47149E82F2F1}"/>
+              </a:ext>
+              <a:ext uri="{C183D7F6-B498-43B3-948B-1728B52AA6E4}">
+                <adec:decorative xmlns:adec="http://schemas.microsoft.com/office/drawing/2017/decorative" val="1"/>
+              </a:ext>
+            </a:extLst>
+          </p:cNvPr>
+          <p:cNvPicPr>
+            <a:picLocks noGrp="1" noRot="1" noChangeAspect="1" noMove="1" noResize="1" noEditPoints="1" noAdjustHandles="1" noChangeArrowheads="1" noChangeShapeType="1" noCrop="1"/>
+          </p:cNvPicPr>
+          <p:nvPr>
+            <p:extLst>
+              <p:ext uri="{386F3935-93C4-4BCD-93E2-E3B085C9AB24}">
+                <p16:designElem xmlns:p16="http://schemas.microsoft.com/office/powerpoint/2015/main" val="1"/>
+              </p:ext>
+            </p:extLst>
+          </p:nvPr>
+        </p:nvPicPr>
+        <p:blipFill rotWithShape="1">
+          <a:blip r:embed="rId4">
+            <a:extLst>
+              <a:ext uri="{28A0092B-C50C-407E-A947-70E740481C1C}">
+                <a14:useLocalDpi xmlns:a14="http://schemas.microsoft.com/office/drawing/2010/main" val="0"/>
+              </a:ext>
+            </a:extLst>
+          </a:blip>
+          <a:srcRect l="34623" r="26442" b="66400"/>
+          <a:stretch/>
+        </p:blipFill>
+        <p:spPr>
+          <a:xfrm rot="1800000" flipH="1">
+            <a:off x="367393" y="4502250"/>
+            <a:ext cx="1354657" cy="657584"/>
+          </a:xfrm>
+          <a:custGeom>
+            <a:avLst/>
+            <a:gdLst>
+              <a:gd name="connsiteX0" fmla="*/ 527412 w 1806209"/>
+              <a:gd name="connsiteY0" fmla="*/ 0 h 876778"/>
+              <a:gd name="connsiteX1" fmla="*/ 0 w 1806209"/>
+              <a:gd name="connsiteY1" fmla="*/ 0 h 876778"/>
+              <a:gd name="connsiteX2" fmla="*/ 0 w 1806209"/>
+              <a:gd name="connsiteY2" fmla="*/ 255471 h 876778"/>
+              <a:gd name="connsiteX3" fmla="*/ 10065 w 1806209"/>
+              <a:gd name="connsiteY3" fmla="*/ 245407 h 876778"/>
+              <a:gd name="connsiteX4" fmla="*/ 20951 w 1806209"/>
+              <a:gd name="connsiteY4" fmla="*/ 234521 h 876778"/>
+              <a:gd name="connsiteX5" fmla="*/ 53608 w 1806209"/>
+              <a:gd name="connsiteY5" fmla="*/ 223635 h 876778"/>
+              <a:gd name="connsiteX6" fmla="*/ 118922 w 1806209"/>
+              <a:gd name="connsiteY6" fmla="*/ 190978 h 876778"/>
+              <a:gd name="connsiteX7" fmla="*/ 206008 w 1806209"/>
+              <a:gd name="connsiteY7" fmla="*/ 147435 h 876778"/>
+              <a:gd name="connsiteX8" fmla="*/ 238665 w 1806209"/>
+              <a:gd name="connsiteY8" fmla="*/ 125664 h 876778"/>
+              <a:gd name="connsiteX9" fmla="*/ 260436 w 1806209"/>
+              <a:gd name="connsiteY9" fmla="*/ 103892 h 876778"/>
+              <a:gd name="connsiteX10" fmla="*/ 303979 w 1806209"/>
+              <a:gd name="connsiteY10" fmla="*/ 93007 h 876778"/>
+              <a:gd name="connsiteX11" fmla="*/ 336636 w 1806209"/>
+              <a:gd name="connsiteY11" fmla="*/ 82121 h 876778"/>
+              <a:gd name="connsiteX12" fmla="*/ 358408 w 1806209"/>
+              <a:gd name="connsiteY12" fmla="*/ 60350 h 876778"/>
+              <a:gd name="connsiteX13" fmla="*/ 412836 w 1806209"/>
+              <a:gd name="connsiteY13" fmla="*/ 49464 h 876778"/>
+              <a:gd name="connsiteX14" fmla="*/ 478151 w 1806209"/>
+              <a:gd name="connsiteY14" fmla="*/ 27692 h 876778"/>
+              <a:gd name="connsiteX15" fmla="*/ 510808 w 1806209"/>
+              <a:gd name="connsiteY15" fmla="*/ 16807 h 876778"/>
+              <a:gd name="connsiteX16" fmla="*/ 1806209 w 1806209"/>
+              <a:gd name="connsiteY16" fmla="*/ 0 h 876778"/>
+              <a:gd name="connsiteX17" fmla="*/ 708134 w 1806209"/>
+              <a:gd name="connsiteY17" fmla="*/ 0 h 876778"/>
+              <a:gd name="connsiteX18" fmla="*/ 709028 w 1806209"/>
+              <a:gd name="connsiteY18" fmla="*/ 1950 h 876778"/>
+              <a:gd name="connsiteX19" fmla="*/ 641436 w 1806209"/>
+              <a:gd name="connsiteY19" fmla="*/ 71235 h 876778"/>
+              <a:gd name="connsiteX20" fmla="*/ 576122 w 1806209"/>
+              <a:gd name="connsiteY20" fmla="*/ 114778 h 876778"/>
+              <a:gd name="connsiteX21" fmla="*/ 543465 w 1806209"/>
+              <a:gd name="connsiteY21" fmla="*/ 125664 h 876778"/>
+              <a:gd name="connsiteX22" fmla="*/ 510808 w 1806209"/>
+              <a:gd name="connsiteY22" fmla="*/ 147435 h 876778"/>
+              <a:gd name="connsiteX23" fmla="*/ 314865 w 1806209"/>
+              <a:gd name="connsiteY23" fmla="*/ 169207 h 876778"/>
+              <a:gd name="connsiteX24" fmla="*/ 260436 w 1806209"/>
+              <a:gd name="connsiteY24" fmla="*/ 212750 h 876778"/>
+              <a:gd name="connsiteX25" fmla="*/ 195122 w 1806209"/>
+              <a:gd name="connsiteY25" fmla="*/ 256292 h 876778"/>
+              <a:gd name="connsiteX26" fmla="*/ 140694 w 1806209"/>
+              <a:gd name="connsiteY26" fmla="*/ 321607 h 876778"/>
+              <a:gd name="connsiteX27" fmla="*/ 86265 w 1806209"/>
+              <a:gd name="connsiteY27" fmla="*/ 376035 h 876778"/>
+              <a:gd name="connsiteX28" fmla="*/ 42722 w 1806209"/>
+              <a:gd name="connsiteY28" fmla="*/ 430464 h 876778"/>
+              <a:gd name="connsiteX29" fmla="*/ 2368 w 1806209"/>
+              <a:gd name="connsiteY29" fmla="*/ 445198 h 876778"/>
+              <a:gd name="connsiteX30" fmla="*/ 0 w 1806209"/>
+              <a:gd name="connsiteY30" fmla="*/ 445880 h 876778"/>
+              <a:gd name="connsiteX31" fmla="*/ 0 w 1806209"/>
+              <a:gd name="connsiteY31" fmla="*/ 876778 h 876778"/>
+              <a:gd name="connsiteX32" fmla="*/ 1806209 w 1806209"/>
+              <a:gd name="connsiteY32" fmla="*/ 876778 h 876778"/>
+            </a:gdLst>
+            <a:ahLst/>
+            <a:cxnLst>
+              <a:cxn ang="0">
+                <a:pos x="connsiteX0" y="connsiteY0"/>
+              </a:cxn>
+              <a:cxn ang="0">
+                <a:pos x="connsiteX1" y="connsiteY1"/>
+              </a:cxn>
+              <a:cxn ang="0">
+                <a:pos x="connsiteX2" y="connsiteY2"/>
+              </a:cxn>
+              <a:cxn ang="0">
+                <a:pos x="connsiteX3" y="connsiteY3"/>
+              </a:cxn>
+              <a:cxn ang="0">
+                <a:pos x="connsiteX4" y="connsiteY4"/>
+              </a:cxn>
+              <a:cxn ang="0">
+                <a:pos x="connsiteX5" y="connsiteY5"/>
+              </a:cxn>
+              <a:cxn ang="0">
+                <a:pos x="connsiteX6" y="connsiteY6"/>
+              </a:cxn>
+              <a:cxn ang="0">
+                <a:pos x="connsiteX7" y="connsiteY7"/>
+              </a:cxn>
+              <a:cxn ang="0">
+                <a:pos x="connsiteX8" y="connsiteY8"/>
+              </a:cxn>
+              <a:cxn ang="0">
+                <a:pos x="connsiteX9" y="connsiteY9"/>
+              </a:cxn>
+              <a:cxn ang="0">
+                <a:pos x="connsiteX10" y="connsiteY10"/>
+              </a:cxn>
+              <a:cxn ang="0">
+                <a:pos x="connsiteX11" y="connsiteY11"/>
+              </a:cxn>
+              <a:cxn ang="0">
+                <a:pos x="connsiteX12" y="connsiteY12"/>
+              </a:cxn>
+              <a:cxn ang="0">
+                <a:pos x="connsiteX13" y="connsiteY13"/>
+              </a:cxn>
+              <a:cxn ang="0">
+                <a:pos x="connsiteX14" y="connsiteY14"/>
+              </a:cxn>
+              <a:cxn ang="0">
+                <a:pos x="connsiteX15" y="connsiteY15"/>
+              </a:cxn>
+              <a:cxn ang="0">
+                <a:pos x="connsiteX16" y="connsiteY16"/>
+              </a:cxn>
+              <a:cxn ang="0">
+                <a:pos x="connsiteX17" y="connsiteY17"/>
+              </a:cxn>
+              <a:cxn ang="0">
+                <a:pos x="connsiteX18" y="connsiteY18"/>
+              </a:cxn>
+              <a:cxn ang="0">
+                <a:pos x="connsiteX19" y="connsiteY19"/>
+              </a:cxn>
+              <a:cxn ang="0">
+                <a:pos x="connsiteX20" y="connsiteY20"/>
+              </a:cxn>
+              <a:cxn ang="0">
+                <a:pos x="connsiteX21" y="connsiteY21"/>
+              </a:cxn>
+              <a:cxn ang="0">
+                <a:pos x="connsiteX22" y="connsiteY22"/>
+              </a:cxn>
+              <a:cxn ang="0">
+                <a:pos x="connsiteX23" y="connsiteY23"/>
+              </a:cxn>
+              <a:cxn ang="0">
+                <a:pos x="connsiteX24" y="connsiteY24"/>
+              </a:cxn>
+              <a:cxn ang="0">
+                <a:pos x="connsiteX25" y="connsiteY25"/>
+              </a:cxn>
+              <a:cxn ang="0">
+                <a:pos x="connsiteX26" y="connsiteY26"/>
+              </a:cxn>
+              <a:cxn ang="0">
+                <a:pos x="connsiteX27" y="connsiteY27"/>
+              </a:cxn>
+              <a:cxn ang="0">
+                <a:pos x="connsiteX28" y="connsiteY28"/>
+              </a:cxn>
+              <a:cxn ang="0">
+                <a:pos x="connsiteX29" y="connsiteY29"/>
+              </a:cxn>
+              <a:cxn ang="0">
+                <a:pos x="connsiteX30" y="connsiteY30"/>
+              </a:cxn>
+              <a:cxn ang="0">
+                <a:pos x="connsiteX31" y="connsiteY31"/>
+              </a:cxn>
+              <a:cxn ang="0">
+                <a:pos x="connsiteX32" y="connsiteY32"/>
+              </a:cxn>
+            </a:cxnLst>
+            <a:rect l="l" t="t" r="r" b="b"/>
+            <a:pathLst>
+              <a:path w="1806209" h="876778">
+                <a:moveTo>
+                  <a:pt x="527412" y="0"/>
+                </a:moveTo>
+                <a:lnTo>
+                  <a:pt x="0" y="0"/>
+                </a:lnTo>
+                <a:lnTo>
+                  <a:pt x="0" y="255471"/>
+                </a:lnTo>
+                <a:lnTo>
+                  <a:pt x="10065" y="245407"/>
+                </a:lnTo>
+                <a:cubicBezTo>
+                  <a:pt x="13308" y="241284"/>
+                  <a:pt x="16551" y="237161"/>
+                  <a:pt x="20951" y="234521"/>
+                </a:cubicBezTo>
+                <a:cubicBezTo>
+                  <a:pt x="30790" y="228617"/>
+                  <a:pt x="43345" y="228767"/>
+                  <a:pt x="53608" y="223635"/>
+                </a:cubicBezTo>
+                <a:cubicBezTo>
+                  <a:pt x="138017" y="181431"/>
+                  <a:pt x="36838" y="218340"/>
+                  <a:pt x="118922" y="190978"/>
+                </a:cubicBezTo>
+                <a:cubicBezTo>
+                  <a:pt x="156922" y="152980"/>
+                  <a:pt x="130958" y="172453"/>
+                  <a:pt x="206008" y="147435"/>
+                </a:cubicBezTo>
+                <a:cubicBezTo>
+                  <a:pt x="216894" y="140178"/>
+                  <a:pt x="228449" y="133837"/>
+                  <a:pt x="238665" y="125664"/>
+                </a:cubicBezTo>
+                <a:cubicBezTo>
+                  <a:pt x="246679" y="119253"/>
+                  <a:pt x="251256" y="108482"/>
+                  <a:pt x="260436" y="103892"/>
+                </a:cubicBezTo>
+                <a:cubicBezTo>
+                  <a:pt x="273817" y="97201"/>
+                  <a:pt x="289594" y="97117"/>
+                  <a:pt x="303979" y="93007"/>
+                </a:cubicBezTo>
+                <a:cubicBezTo>
+                  <a:pt x="315012" y="89855"/>
+                  <a:pt x="325750" y="85750"/>
+                  <a:pt x="336636" y="82121"/>
+                </a:cubicBezTo>
+                <a:cubicBezTo>
+                  <a:pt x="343893" y="74864"/>
+                  <a:pt x="348975" y="64393"/>
+                  <a:pt x="358408" y="60350"/>
+                </a:cubicBezTo>
+                <a:cubicBezTo>
+                  <a:pt x="375414" y="53062"/>
+                  <a:pt x="394986" y="54332"/>
+                  <a:pt x="412836" y="49464"/>
+                </a:cubicBezTo>
+                <a:cubicBezTo>
+                  <a:pt x="434977" y="43425"/>
+                  <a:pt x="456379" y="34949"/>
+                  <a:pt x="478151" y="27692"/>
+                </a:cubicBezTo>
+                <a:lnTo>
+                  <a:pt x="510808" y="16807"/>
+                </a:lnTo>
+                <a:close/>
+                <a:moveTo>
+                  <a:pt x="1806209" y="0"/>
+                </a:moveTo>
+                <a:lnTo>
+                  <a:pt x="708134" y="0"/>
+                </a:lnTo>
+                <a:lnTo>
+                  <a:pt x="709028" y="1950"/>
+                </a:lnTo>
+                <a:cubicBezTo>
+                  <a:pt x="728907" y="60380"/>
+                  <a:pt x="677113" y="62316"/>
+                  <a:pt x="641436" y="71235"/>
+                </a:cubicBezTo>
+                <a:cubicBezTo>
+                  <a:pt x="619665" y="85749"/>
+                  <a:pt x="600945" y="106503"/>
+                  <a:pt x="576122" y="114778"/>
+                </a:cubicBezTo>
+                <a:cubicBezTo>
+                  <a:pt x="565236" y="118407"/>
+                  <a:pt x="553728" y="120532"/>
+                  <a:pt x="543465" y="125664"/>
+                </a:cubicBezTo>
+                <a:cubicBezTo>
+                  <a:pt x="531763" y="131515"/>
+                  <a:pt x="523220" y="143298"/>
+                  <a:pt x="510808" y="147435"/>
+                </a:cubicBezTo>
+                <a:cubicBezTo>
+                  <a:pt x="474669" y="159481"/>
+                  <a:pt x="324413" y="168411"/>
+                  <a:pt x="314865" y="169207"/>
+                </a:cubicBezTo>
+                <a:cubicBezTo>
+                  <a:pt x="241324" y="193719"/>
+                  <a:pt x="321038" y="159724"/>
+                  <a:pt x="260436" y="212750"/>
+                </a:cubicBezTo>
+                <a:cubicBezTo>
+                  <a:pt x="240744" y="229980"/>
+                  <a:pt x="195122" y="256292"/>
+                  <a:pt x="195122" y="256292"/>
+                </a:cubicBezTo>
+                <a:cubicBezTo>
+                  <a:pt x="141076" y="337364"/>
+                  <a:pt x="210531" y="237803"/>
+                  <a:pt x="140694" y="321607"/>
+                </a:cubicBezTo>
+                <a:cubicBezTo>
+                  <a:pt x="95337" y="376034"/>
+                  <a:pt x="146135" y="336122"/>
+                  <a:pt x="86265" y="376035"/>
+                </a:cubicBezTo>
+                <a:cubicBezTo>
+                  <a:pt x="78573" y="387573"/>
+                  <a:pt x="58234" y="422708"/>
+                  <a:pt x="42722" y="430464"/>
+                </a:cubicBezTo>
+                <a:cubicBezTo>
+                  <a:pt x="32459" y="435596"/>
+                  <a:pt x="16131" y="441039"/>
+                  <a:pt x="2368" y="445198"/>
+                </a:cubicBezTo>
+                <a:lnTo>
+                  <a:pt x="0" y="445880"/>
+                </a:lnTo>
+                <a:lnTo>
+                  <a:pt x="0" y="876778"/>
+                </a:lnTo>
+                <a:lnTo>
+                  <a:pt x="1806209" y="876778"/>
+                </a:lnTo>
+                <a:close/>
+              </a:path>
+            </a:pathLst>
+          </a:custGeom>
+        </p:spPr>
+      </p:pic>
+      <p:sp>
+        <p:nvSpPr>
+          <p:cNvPr id="58" name="Freeform: Shape 17">
+            <a:extLst>
+              <a:ext uri="{FF2B5EF4-FFF2-40B4-BE49-F238E27FC236}">
+                <a16:creationId xmlns:a16="http://schemas.microsoft.com/office/drawing/2014/main" id="{57E6F9A8-1B4B-4FEF-942A-15CA97ECE0BA}"/>
+              </a:ext>
+              <a:ext uri="{C183D7F6-B498-43B3-948B-1728B52AA6E4}">
+                <adec:decorative xmlns:adec="http://schemas.microsoft.com/office/drawing/2017/decorative" val="1"/>
+              </a:ext>
+            </a:extLst>
+          </p:cNvPr>
+          <p:cNvSpPr>
+            <a:spLocks noGrp="1" noRot="1" noChangeAspect="1" noMove="1" noResize="1" noEditPoints="1" noAdjustHandles="1" noChangeArrowheads="1" noChangeShapeType="1" noTextEdit="1"/>
+          </p:cNvSpPr>
+          <p:nvPr>
+            <p:extLst>
+              <p:ext uri="{386F3935-93C4-4BCD-93E2-E3B085C9AB24}">
+                <p16:designElem xmlns:p16="http://schemas.microsoft.com/office/powerpoint/2015/main" val="1"/>
+              </p:ext>
+            </p:extLst>
+          </p:nvPr>
+        </p:nvSpPr>
+        <p:spPr>
+          <a:xfrm>
+            <a:off x="2510128" y="857250"/>
+            <a:ext cx="6633872" cy="5143500"/>
+          </a:xfrm>
+          <a:custGeom>
+            <a:avLst/>
+            <a:gdLst>
+              <a:gd name="connsiteX0" fmla="*/ 0 w 8845162"/>
+              <a:gd name="connsiteY0" fmla="*/ 0 h 6858000"/>
+              <a:gd name="connsiteX1" fmla="*/ 6265248 w 8845162"/>
+              <a:gd name="connsiteY1" fmla="*/ 0 h 6858000"/>
+              <a:gd name="connsiteX2" fmla="*/ 7537703 w 8845162"/>
+              <a:gd name="connsiteY2" fmla="*/ 0 h 6858000"/>
+              <a:gd name="connsiteX3" fmla="*/ 8845162 w 8845162"/>
+              <a:gd name="connsiteY3" fmla="*/ 0 h 6858000"/>
+              <a:gd name="connsiteX4" fmla="*/ 8845162 w 8845162"/>
+              <a:gd name="connsiteY4" fmla="*/ 6858000 h 6858000"/>
+              <a:gd name="connsiteX5" fmla="*/ 7537703 w 8845162"/>
+              <a:gd name="connsiteY5" fmla="*/ 6858000 h 6858000"/>
+              <a:gd name="connsiteX6" fmla="*/ 6265248 w 8845162"/>
+              <a:gd name="connsiteY6" fmla="*/ 6858000 h 6858000"/>
+              <a:gd name="connsiteX7" fmla="*/ 20957 w 8845162"/>
+              <a:gd name="connsiteY7" fmla="*/ 6858000 h 6858000"/>
+              <a:gd name="connsiteX8" fmla="*/ 46002 w 8845162"/>
+              <a:gd name="connsiteY8" fmla="*/ 6702325 h 6858000"/>
+              <a:gd name="connsiteX9" fmla="*/ 69870 w 8845162"/>
+              <a:gd name="connsiteY9" fmla="*/ 6547334 h 6858000"/>
+              <a:gd name="connsiteX10" fmla="*/ 93234 w 8845162"/>
+              <a:gd name="connsiteY10" fmla="*/ 6391658 h 6858000"/>
+              <a:gd name="connsiteX11" fmla="*/ 113237 w 8845162"/>
+              <a:gd name="connsiteY11" fmla="*/ 6235295 h 6858000"/>
+              <a:gd name="connsiteX12" fmla="*/ 133409 w 8845162"/>
+              <a:gd name="connsiteY12" fmla="*/ 6079619 h 6858000"/>
+              <a:gd name="connsiteX13" fmla="*/ 152234 w 8845162"/>
+              <a:gd name="connsiteY13" fmla="*/ 5923256 h 6858000"/>
+              <a:gd name="connsiteX14" fmla="*/ 168370 w 8845162"/>
+              <a:gd name="connsiteY14" fmla="*/ 5768951 h 6858000"/>
+              <a:gd name="connsiteX15" fmla="*/ 183667 w 8845162"/>
+              <a:gd name="connsiteY15" fmla="*/ 5612589 h 6858000"/>
+              <a:gd name="connsiteX16" fmla="*/ 197619 w 8845162"/>
+              <a:gd name="connsiteY16" fmla="*/ 5456912 h 6858000"/>
+              <a:gd name="connsiteX17" fmla="*/ 209720 w 8845162"/>
+              <a:gd name="connsiteY17" fmla="*/ 5303979 h 6858000"/>
+              <a:gd name="connsiteX18" fmla="*/ 221823 w 8845162"/>
+              <a:gd name="connsiteY18" fmla="*/ 5148988 h 6858000"/>
+              <a:gd name="connsiteX19" fmla="*/ 231908 w 8845162"/>
+              <a:gd name="connsiteY19" fmla="*/ 4996055 h 6858000"/>
+              <a:gd name="connsiteX20" fmla="*/ 239808 w 8845162"/>
+              <a:gd name="connsiteY20" fmla="*/ 4843121 h 6858000"/>
+              <a:gd name="connsiteX21" fmla="*/ 248045 w 8845162"/>
+              <a:gd name="connsiteY21" fmla="*/ 4690874 h 6858000"/>
+              <a:gd name="connsiteX22" fmla="*/ 254936 w 8845162"/>
+              <a:gd name="connsiteY22" fmla="*/ 4539998 h 6858000"/>
+              <a:gd name="connsiteX23" fmla="*/ 259811 w 8845162"/>
+              <a:gd name="connsiteY23" fmla="*/ 4390493 h 6858000"/>
+              <a:gd name="connsiteX24" fmla="*/ 264014 w 8845162"/>
+              <a:gd name="connsiteY24" fmla="*/ 4240989 h 6858000"/>
+              <a:gd name="connsiteX25" fmla="*/ 268047 w 8845162"/>
+              <a:gd name="connsiteY25" fmla="*/ 4092856 h 6858000"/>
+              <a:gd name="connsiteX26" fmla="*/ 269897 w 8845162"/>
+              <a:gd name="connsiteY26" fmla="*/ 3946781 h 6858000"/>
+              <a:gd name="connsiteX27" fmla="*/ 271913 w 8845162"/>
+              <a:gd name="connsiteY27" fmla="*/ 3800705 h 6858000"/>
+              <a:gd name="connsiteX28" fmla="*/ 272922 w 8845162"/>
+              <a:gd name="connsiteY28" fmla="*/ 3656687 h 6858000"/>
+              <a:gd name="connsiteX29" fmla="*/ 271913 w 8845162"/>
+              <a:gd name="connsiteY29" fmla="*/ 3514041 h 6858000"/>
+              <a:gd name="connsiteX30" fmla="*/ 271913 w 8845162"/>
+              <a:gd name="connsiteY30" fmla="*/ 3372766 h 6858000"/>
+              <a:gd name="connsiteX31" fmla="*/ 269897 w 8845162"/>
+              <a:gd name="connsiteY31" fmla="*/ 3232863 h 6858000"/>
+              <a:gd name="connsiteX32" fmla="*/ 266871 w 8845162"/>
+              <a:gd name="connsiteY32" fmla="*/ 3095703 h 6858000"/>
+              <a:gd name="connsiteX33" fmla="*/ 264014 w 8845162"/>
+              <a:gd name="connsiteY33" fmla="*/ 2959915 h 6858000"/>
+              <a:gd name="connsiteX34" fmla="*/ 260820 w 8845162"/>
+              <a:gd name="connsiteY34" fmla="*/ 2826869 h 6858000"/>
+              <a:gd name="connsiteX35" fmla="*/ 255946 w 8845162"/>
+              <a:gd name="connsiteY35" fmla="*/ 2694510 h 6858000"/>
+              <a:gd name="connsiteX36" fmla="*/ 250734 w 8845162"/>
+              <a:gd name="connsiteY36" fmla="*/ 2564209 h 6858000"/>
+              <a:gd name="connsiteX37" fmla="*/ 246028 w 8845162"/>
+              <a:gd name="connsiteY37" fmla="*/ 2436650 h 6858000"/>
+              <a:gd name="connsiteX38" fmla="*/ 232749 w 8845162"/>
+              <a:gd name="connsiteY38" fmla="*/ 2187704 h 6858000"/>
+              <a:gd name="connsiteX39" fmla="*/ 218630 w 8845162"/>
+              <a:gd name="connsiteY39" fmla="*/ 1949046 h 6858000"/>
+              <a:gd name="connsiteX40" fmla="*/ 203837 w 8845162"/>
+              <a:gd name="connsiteY40" fmla="*/ 1719989 h 6858000"/>
+              <a:gd name="connsiteX41" fmla="*/ 187532 w 8845162"/>
+              <a:gd name="connsiteY41" fmla="*/ 1503276 h 6858000"/>
+              <a:gd name="connsiteX42" fmla="*/ 170555 w 8845162"/>
+              <a:gd name="connsiteY42" fmla="*/ 1296164 h 6858000"/>
+              <a:gd name="connsiteX43" fmla="*/ 152234 w 8845162"/>
+              <a:gd name="connsiteY43" fmla="*/ 1104140 h 6858000"/>
+              <a:gd name="connsiteX44" fmla="*/ 134248 w 8845162"/>
+              <a:gd name="connsiteY44" fmla="*/ 923775 h 6858000"/>
+              <a:gd name="connsiteX45" fmla="*/ 116263 w 8845162"/>
+              <a:gd name="connsiteY45" fmla="*/ 757811 h 6858000"/>
+              <a:gd name="connsiteX46" fmla="*/ 99286 w 8845162"/>
+              <a:gd name="connsiteY46" fmla="*/ 605564 h 6858000"/>
+              <a:gd name="connsiteX47" fmla="*/ 83149 w 8845162"/>
+              <a:gd name="connsiteY47" fmla="*/ 470461 h 6858000"/>
+              <a:gd name="connsiteX48" fmla="*/ 67853 w 8845162"/>
+              <a:gd name="connsiteY48" fmla="*/ 348389 h 6858000"/>
+              <a:gd name="connsiteX49" fmla="*/ 55078 w 8845162"/>
+              <a:gd name="connsiteY49" fmla="*/ 245519 h 6858000"/>
+              <a:gd name="connsiteX50" fmla="*/ 42976 w 8845162"/>
+              <a:gd name="connsiteY50" fmla="*/ 159108 h 6858000"/>
+              <a:gd name="connsiteX51" fmla="*/ 25662 w 8845162"/>
+              <a:gd name="connsiteY51" fmla="*/ 40464 h 6858000"/>
+              <a:gd name="connsiteX52" fmla="*/ 19779 w 8845162"/>
+              <a:gd name="connsiteY52" fmla="*/ 2 h 6858000"/>
+              <a:gd name="connsiteX53" fmla="*/ 26532 w 8845162"/>
+              <a:gd name="connsiteY53" fmla="*/ 2 h 6858000"/>
+              <a:gd name="connsiteX54" fmla="*/ 26532 w 8845162"/>
+              <a:gd name="connsiteY54" fmla="*/ 1 h 6858000"/>
+              <a:gd name="connsiteX55" fmla="*/ 0 w 8845162"/>
+              <a:gd name="connsiteY55" fmla="*/ 1 h 6858000"/>
+            </a:gdLst>
+            <a:ahLst/>
+            <a:cxnLst>
+              <a:cxn ang="0">
+                <a:pos x="connsiteX0" y="connsiteY0"/>
+              </a:cxn>
+              <a:cxn ang="0">
+                <a:pos x="connsiteX1" y="connsiteY1"/>
+              </a:cxn>
+              <a:cxn ang="0">
+                <a:pos x="connsiteX2" y="connsiteY2"/>
+              </a:cxn>
+              <a:cxn ang="0">
+                <a:pos x="connsiteX3" y="connsiteY3"/>
+              </a:cxn>
+              <a:cxn ang="0">
+                <a:pos x="connsiteX4" y="connsiteY4"/>
+              </a:cxn>
+              <a:cxn ang="0">
+                <a:pos x="connsiteX5" y="connsiteY5"/>
+              </a:cxn>
+              <a:cxn ang="0">
+                <a:pos x="connsiteX6" y="connsiteY6"/>
+              </a:cxn>
+              <a:cxn ang="0">
+                <a:pos x="connsiteX7" y="connsiteY7"/>
+              </a:cxn>
+              <a:cxn ang="0">
+                <a:pos x="connsiteX8" y="connsiteY8"/>
+              </a:cxn>
+              <a:cxn ang="0">
+                <a:pos x="connsiteX9" y="connsiteY9"/>
+              </a:cxn>
+              <a:cxn ang="0">
+                <a:pos x="connsiteX10" y="connsiteY10"/>
+              </a:cxn>
+              <a:cxn ang="0">
+                <a:pos x="connsiteX11" y="connsiteY11"/>
+              </a:cxn>
+              <a:cxn ang="0">
+                <a:pos x="connsiteX12" y="connsiteY12"/>
+              </a:cxn>
+              <a:cxn ang="0">
+                <a:pos x="connsiteX13" y="connsiteY13"/>
+              </a:cxn>
+              <a:cxn ang="0">
+                <a:pos x="connsiteX14" y="connsiteY14"/>
+              </a:cxn>
+              <a:cxn ang="0">
+                <a:pos x="connsiteX15" y="connsiteY15"/>
+              </a:cxn>
+              <a:cxn ang="0">
+                <a:pos x="connsiteX16" y="connsiteY16"/>
+              </a:cxn>
+              <a:cxn ang="0">
+                <a:pos x="connsiteX17" y="connsiteY17"/>
+              </a:cxn>
+              <a:cxn ang="0">
+                <a:pos x="connsiteX18" y="connsiteY18"/>
+              </a:cxn>
+              <a:cxn ang="0">
+                <a:pos x="connsiteX19" y="connsiteY19"/>
+              </a:cxn>
+              <a:cxn ang="0">
+                <a:pos x="connsiteX20" y="connsiteY20"/>
+              </a:cxn>
+              <a:cxn ang="0">
+                <a:pos x="connsiteX21" y="connsiteY21"/>
+              </a:cxn>
+              <a:cxn ang="0">
+                <a:pos x="connsiteX22" y="connsiteY22"/>
+              </a:cxn>
+              <a:cxn ang="0">
+                <a:pos x="connsiteX23" y="connsiteY23"/>
+              </a:cxn>
+              <a:cxn ang="0">
+                <a:pos x="connsiteX24" y="connsiteY24"/>
+              </a:cxn>
+              <a:cxn ang="0">
+                <a:pos x="connsiteX25" y="connsiteY25"/>
+              </a:cxn>
+              <a:cxn ang="0">
+                <a:pos x="connsiteX26" y="connsiteY26"/>
+              </a:cxn>
+              <a:cxn ang="0">
+                <a:pos x="connsiteX27" y="connsiteY27"/>
+              </a:cxn>
+              <a:cxn ang="0">
+                <a:pos x="connsiteX28" y="connsiteY28"/>
+              </a:cxn>
+              <a:cxn ang="0">
+                <a:pos x="connsiteX29" y="connsiteY29"/>
+              </a:cxn>
+              <a:cxn ang="0">
+                <a:pos x="connsiteX30" y="connsiteY30"/>
+              </a:cxn>
+              <a:cxn ang="0">
+                <a:pos x="connsiteX31" y="connsiteY31"/>
+              </a:cxn>
+              <a:cxn ang="0">
+                <a:pos x="connsiteX32" y="connsiteY32"/>
+              </a:cxn>
+              <a:cxn ang="0">
+                <a:pos x="connsiteX33" y="connsiteY33"/>
+              </a:cxn>
+              <a:cxn ang="0">
+                <a:pos x="connsiteX34" y="connsiteY34"/>
+              </a:cxn>
+              <a:cxn ang="0">
+                <a:pos x="connsiteX35" y="connsiteY35"/>
+              </a:cxn>
+              <a:cxn ang="0">
+                <a:pos x="connsiteX36" y="connsiteY36"/>
+              </a:cxn>
+              <a:cxn ang="0">
+                <a:pos x="connsiteX37" y="connsiteY37"/>
+              </a:cxn>
+              <a:cxn ang="0">
+                <a:pos x="connsiteX38" y="connsiteY38"/>
+              </a:cxn>
+              <a:cxn ang="0">
+                <a:pos x="connsiteX39" y="connsiteY39"/>
+              </a:cxn>
+              <a:cxn ang="0">
+                <a:pos x="connsiteX40" y="connsiteY40"/>
+              </a:cxn>
+              <a:cxn ang="0">
+                <a:pos x="connsiteX41" y="connsiteY41"/>
+              </a:cxn>
+              <a:cxn ang="0">
+                <a:pos x="connsiteX42" y="connsiteY42"/>
+              </a:cxn>
+              <a:cxn ang="0">
+                <a:pos x="connsiteX43" y="connsiteY43"/>
+              </a:cxn>
+              <a:cxn ang="0">
+                <a:pos x="connsiteX44" y="connsiteY44"/>
+              </a:cxn>
+              <a:cxn ang="0">
+                <a:pos x="connsiteX45" y="connsiteY45"/>
+              </a:cxn>
+              <a:cxn ang="0">
+                <a:pos x="connsiteX46" y="connsiteY46"/>
+              </a:cxn>
+              <a:cxn ang="0">
+                <a:pos x="connsiteX47" y="connsiteY47"/>
+              </a:cxn>
+              <a:cxn ang="0">
+                <a:pos x="connsiteX48" y="connsiteY48"/>
+              </a:cxn>
+              <a:cxn ang="0">
+                <a:pos x="connsiteX49" y="connsiteY49"/>
+              </a:cxn>
+              <a:cxn ang="0">
+                <a:pos x="connsiteX50" y="connsiteY50"/>
+              </a:cxn>
+              <a:cxn ang="0">
+                <a:pos x="connsiteX51" y="connsiteY51"/>
+              </a:cxn>
+              <a:cxn ang="0">
+                <a:pos x="connsiteX52" y="connsiteY52"/>
+              </a:cxn>
+              <a:cxn ang="0">
+                <a:pos x="connsiteX53" y="connsiteY53"/>
+              </a:cxn>
+              <a:cxn ang="0">
+                <a:pos x="connsiteX54" y="connsiteY54"/>
+              </a:cxn>
+              <a:cxn ang="0">
+                <a:pos x="connsiteX55" y="connsiteY55"/>
+              </a:cxn>
+            </a:cxnLst>
+            <a:rect l="l" t="t" r="r" b="b"/>
+            <a:pathLst>
+              <a:path w="8845162" h="6858000">
+                <a:moveTo>
+                  <a:pt x="0" y="0"/>
+                </a:moveTo>
+                <a:lnTo>
+                  <a:pt x="6265248" y="0"/>
+                </a:lnTo>
+                <a:lnTo>
+                  <a:pt x="7537703" y="0"/>
+                </a:lnTo>
+                <a:lnTo>
+                  <a:pt x="8845162" y="0"/>
+                </a:lnTo>
+                <a:lnTo>
+                  <a:pt x="8845162" y="6858000"/>
+                </a:lnTo>
+                <a:lnTo>
+                  <a:pt x="7537703" y="6858000"/>
+                </a:lnTo>
+                <a:lnTo>
+                  <a:pt x="6265248" y="6858000"/>
+                </a:lnTo>
+                <a:lnTo>
+                  <a:pt x="20957" y="6858000"/>
+                </a:lnTo>
+                <a:lnTo>
+                  <a:pt x="46002" y="6702325"/>
+                </a:lnTo>
+                <a:lnTo>
+                  <a:pt x="69870" y="6547334"/>
+                </a:lnTo>
+                <a:lnTo>
+                  <a:pt x="93234" y="6391658"/>
+                </a:lnTo>
+                <a:lnTo>
+                  <a:pt x="113237" y="6235295"/>
+                </a:lnTo>
+                <a:lnTo>
+                  <a:pt x="133409" y="6079619"/>
+                </a:lnTo>
+                <a:lnTo>
+                  <a:pt x="152234" y="5923256"/>
+                </a:lnTo>
+                <a:lnTo>
+                  <a:pt x="168370" y="5768951"/>
+                </a:lnTo>
+                <a:lnTo>
+                  <a:pt x="183667" y="5612589"/>
+                </a:lnTo>
+                <a:lnTo>
+                  <a:pt x="197619" y="5456912"/>
+                </a:lnTo>
+                <a:lnTo>
+                  <a:pt x="209720" y="5303979"/>
+                </a:lnTo>
+                <a:lnTo>
+                  <a:pt x="221823" y="5148988"/>
+                </a:lnTo>
+                <a:lnTo>
+                  <a:pt x="231908" y="4996055"/>
+                </a:lnTo>
+                <a:lnTo>
+                  <a:pt x="239808" y="4843121"/>
+                </a:lnTo>
+                <a:lnTo>
+                  <a:pt x="248045" y="4690874"/>
+                </a:lnTo>
+                <a:lnTo>
+                  <a:pt x="254936" y="4539998"/>
+                </a:lnTo>
+                <a:lnTo>
+                  <a:pt x="259811" y="4390493"/>
+                </a:lnTo>
+                <a:lnTo>
+                  <a:pt x="264014" y="4240989"/>
+                </a:lnTo>
+                <a:lnTo>
+                  <a:pt x="268047" y="4092856"/>
+                </a:lnTo>
+                <a:lnTo>
+                  <a:pt x="269897" y="3946781"/>
+                </a:lnTo>
+                <a:lnTo>
+                  <a:pt x="271913" y="3800705"/>
+                </a:lnTo>
+                <a:lnTo>
+                  <a:pt x="272922" y="3656687"/>
+                </a:lnTo>
+                <a:lnTo>
+                  <a:pt x="271913" y="3514041"/>
+                </a:lnTo>
+                <a:lnTo>
+                  <a:pt x="271913" y="3372766"/>
+                </a:lnTo>
+                <a:lnTo>
+                  <a:pt x="269897" y="3232863"/>
+                </a:lnTo>
+                <a:lnTo>
+                  <a:pt x="266871" y="3095703"/>
+                </a:lnTo>
+                <a:lnTo>
+                  <a:pt x="264014" y="2959915"/>
+                </a:lnTo>
+                <a:lnTo>
+                  <a:pt x="260820" y="2826869"/>
+                </a:lnTo>
+                <a:lnTo>
+                  <a:pt x="255946" y="2694510"/>
+                </a:lnTo>
+                <a:lnTo>
+                  <a:pt x="250734" y="2564209"/>
+                </a:lnTo>
+                <a:lnTo>
+                  <a:pt x="246028" y="2436650"/>
+                </a:lnTo>
+                <a:lnTo>
+                  <a:pt x="232749" y="2187704"/>
+                </a:lnTo>
+                <a:lnTo>
+                  <a:pt x="218630" y="1949046"/>
+                </a:lnTo>
+                <a:lnTo>
+                  <a:pt x="203837" y="1719989"/>
+                </a:lnTo>
+                <a:lnTo>
+                  <a:pt x="187532" y="1503276"/>
+                </a:lnTo>
+                <a:lnTo>
+                  <a:pt x="170555" y="1296164"/>
+                </a:lnTo>
+                <a:lnTo>
+                  <a:pt x="152234" y="1104140"/>
+                </a:lnTo>
+                <a:lnTo>
+                  <a:pt x="134248" y="923775"/>
+                </a:lnTo>
+                <a:lnTo>
+                  <a:pt x="116263" y="757811"/>
+                </a:lnTo>
+                <a:lnTo>
+                  <a:pt x="99286" y="605564"/>
+                </a:lnTo>
+                <a:lnTo>
+                  <a:pt x="83149" y="470461"/>
+                </a:lnTo>
+                <a:lnTo>
+                  <a:pt x="67853" y="348389"/>
+                </a:lnTo>
+                <a:lnTo>
+                  <a:pt x="55078" y="245519"/>
+                </a:lnTo>
+                <a:lnTo>
+                  <a:pt x="42976" y="159108"/>
+                </a:lnTo>
+                <a:lnTo>
+                  <a:pt x="25662" y="40464"/>
+                </a:lnTo>
+                <a:lnTo>
+                  <a:pt x="19779" y="2"/>
+                </a:lnTo>
+                <a:lnTo>
+                  <a:pt x="26532" y="2"/>
+                </a:lnTo>
+                <a:lnTo>
+                  <a:pt x="26532" y="1"/>
+                </a:lnTo>
+                <a:lnTo>
+                  <a:pt x="0" y="1"/>
+                </a:lnTo>
+                <a:close/>
+              </a:path>
+            </a:pathLst>
+          </a:custGeom>
+          <a:solidFill>
+            <a:schemeClr val="bg2"/>
+          </a:solidFill>
+          <a:ln>
+            <a:noFill/>
+          </a:ln>
+        </p:spPr>
+        <p:style>
+          <a:lnRef idx="2">
+            <a:schemeClr val="accent1">
+              <a:shade val="50000"/>
+            </a:schemeClr>
+          </a:lnRef>
+          <a:fillRef idx="1">
+            <a:schemeClr val="accent1"/>
+          </a:fillRef>
+          <a:effectRef idx="0">
+            <a:schemeClr val="accent1"/>
+          </a:effectRef>
+          <a:fontRef idx="minor">
+            <a:schemeClr val="lt1"/>
+          </a:fontRef>
+        </p:style>
+        <p:txBody>
+          <a:bodyPr rtlCol="0" anchor="ctr"/>
+          <a:lstStyle/>
+          <a:p>
+            <a:pPr algn="ctr"/>
+            <a:endParaRPr lang="en-US" sz="1350"/>
+          </a:p>
+        </p:txBody>
+      </p:sp>
+      <p:sp>
+        <p:nvSpPr>
+          <p:cNvPr id="3" name="Title 1"/>
+          <p:cNvSpPr txBox="1">
+            <a:spLocks/>
+          </p:cNvSpPr>
+          <p:nvPr/>
+        </p:nvSpPr>
+        <p:spPr>
+          <a:xfrm>
+            <a:off x="3450519" y="2235660"/>
+            <a:ext cx="5075418" cy="2386679"/>
+          </a:xfrm>
+          <a:prstGeom prst="rect">
+            <a:avLst/>
+          </a:prstGeom>
+        </p:spPr>
+        <p:txBody>
+          <a:bodyPr vert="horz" lIns="91440" tIns="45720" rIns="91440" bIns="45720" rtlCol="0" anchor="t">
+            <a:normAutofit fontScale="92500"/>
+          </a:bodyPr>
+          <a:lstStyle>
+            <a:lvl1pPr algn="l" defTabSz="457200" rtl="0" eaLnBrk="1" latinLnBrk="0" hangingPunct="1">
+              <a:spcBef>
+                <a:spcPct val="0"/>
+              </a:spcBef>
+              <a:buNone/>
+              <a:defRPr sz="3200" kern="1200" cap="all">
+                <a:ln w="3175" cmpd="sng">
+                  <a:noFill/>
+                </a:ln>
+                <a:solidFill>
+                  <a:schemeClr val="tx1"/>
+                </a:solidFill>
+                <a:effectLst/>
+                <a:latin typeface="+mj-lt"/>
+                <a:ea typeface="+mj-ea"/>
+                <a:cs typeface="+mj-cs"/>
+              </a:defRPr>
+            </a:lvl1pPr>
+            <a:lvl2pPr eaLnBrk="1" hangingPunct="1">
+              <a:defRPr>
+                <a:solidFill>
+                  <a:schemeClr val="tx2"/>
+                </a:solidFill>
+              </a:defRPr>
+            </a:lvl2pPr>
+            <a:lvl3pPr eaLnBrk="1" hangingPunct="1">
+              <a:defRPr>
+                <a:solidFill>
+                  <a:schemeClr val="tx2"/>
+                </a:solidFill>
+              </a:defRPr>
+            </a:lvl3pPr>
+            <a:lvl4pPr eaLnBrk="1" hangingPunct="1">
+              <a:defRPr>
+                <a:solidFill>
+                  <a:schemeClr val="tx2"/>
+                </a:solidFill>
+              </a:defRPr>
+            </a:lvl4pPr>
+            <a:lvl5pPr eaLnBrk="1" hangingPunct="1">
+              <a:defRPr>
+                <a:solidFill>
+                  <a:schemeClr val="tx2"/>
+                </a:solidFill>
+              </a:defRPr>
+            </a:lvl5pPr>
+            <a:lvl6pPr eaLnBrk="1" hangingPunct="1">
+              <a:defRPr>
+                <a:solidFill>
+                  <a:schemeClr val="tx2"/>
+                </a:solidFill>
+              </a:defRPr>
+            </a:lvl6pPr>
+            <a:lvl7pPr eaLnBrk="1" hangingPunct="1">
+              <a:defRPr>
+                <a:solidFill>
+                  <a:schemeClr val="tx2"/>
+                </a:solidFill>
+              </a:defRPr>
+            </a:lvl7pPr>
+            <a:lvl8pPr eaLnBrk="1" hangingPunct="1">
+              <a:defRPr>
+                <a:solidFill>
+                  <a:schemeClr val="tx2"/>
+                </a:solidFill>
+              </a:defRPr>
+            </a:lvl8pPr>
+            <a:lvl9pPr eaLnBrk="1" hangingPunct="1">
+              <a:defRPr>
+                <a:solidFill>
+                  <a:schemeClr val="tx2"/>
+                </a:solidFill>
+              </a:defRPr>
+            </a:lvl9pPr>
+          </a:lstStyle>
+          <a:p>
+            <a:pPr algn="r">
+              <a:spcAft>
+                <a:spcPts val="600"/>
+              </a:spcAft>
+            </a:pPr>
+            <a:r>
+              <a:rPr lang="en-US" sz="4950" dirty="0"/>
+              <a:t>Project introduction and Background</a:t>
+            </a:r>
+          </a:p>
+        </p:txBody>
+      </p:sp>
+      <p:pic>
+        <p:nvPicPr>
           <p:cNvPr id="2" name="Picture 1"/>
           <p:cNvPicPr>
             <a:picLocks noChangeAspect="1"/>
@@ -7806,7 +10696,7 @@
           <p:nvPr/>
         </p:nvPicPr>
         <p:blipFill>
-          <a:blip r:embed="rId2"/>
+          <a:blip r:embed="rId5"/>
           <a:stretch>
             <a:fillRect/>
           </a:stretch>
@@ -7821,109 +10711,6 @@
           </a:prstGeom>
         </p:spPr>
       </p:pic>
-      <p:sp>
-        <p:nvSpPr>
-          <p:cNvPr id="3" name="Title 1"/>
-          <p:cNvSpPr txBox="1">
-            <a:spLocks/>
-          </p:cNvSpPr>
-          <p:nvPr/>
-        </p:nvSpPr>
-        <p:spPr>
-          <a:xfrm>
-            <a:off x="275216" y="268044"/>
-            <a:ext cx="6554867" cy="595556"/>
-          </a:xfrm>
-          <a:prstGeom prst="rect">
-            <a:avLst/>
-          </a:prstGeom>
-        </p:spPr>
-        <p:txBody>
-          <a:bodyPr/>
-          <a:lstStyle>
-            <a:lvl1pPr algn="l" defTabSz="457200" rtl="0" eaLnBrk="1" latinLnBrk="0" hangingPunct="1">
-              <a:spcBef>
-                <a:spcPct val="0"/>
-              </a:spcBef>
-              <a:buNone/>
-              <a:defRPr sz="3200" kern="1200" cap="all">
-                <a:ln w="3175" cmpd="sng">
-                  <a:noFill/>
-                </a:ln>
-                <a:solidFill>
-                  <a:schemeClr val="tx1"/>
-                </a:solidFill>
-                <a:effectLst/>
-                <a:latin typeface="+mj-lt"/>
-                <a:ea typeface="+mj-ea"/>
-                <a:cs typeface="+mj-cs"/>
-              </a:defRPr>
-            </a:lvl1pPr>
-            <a:lvl2pPr eaLnBrk="1" hangingPunct="1">
-              <a:defRPr>
-                <a:solidFill>
-                  <a:schemeClr val="tx2"/>
-                </a:solidFill>
-              </a:defRPr>
-            </a:lvl2pPr>
-            <a:lvl3pPr eaLnBrk="1" hangingPunct="1">
-              <a:defRPr>
-                <a:solidFill>
-                  <a:schemeClr val="tx2"/>
-                </a:solidFill>
-              </a:defRPr>
-            </a:lvl3pPr>
-            <a:lvl4pPr eaLnBrk="1" hangingPunct="1">
-              <a:defRPr>
-                <a:solidFill>
-                  <a:schemeClr val="tx2"/>
-                </a:solidFill>
-              </a:defRPr>
-            </a:lvl4pPr>
-            <a:lvl5pPr eaLnBrk="1" hangingPunct="1">
-              <a:defRPr>
-                <a:solidFill>
-                  <a:schemeClr val="tx2"/>
-                </a:solidFill>
-              </a:defRPr>
-            </a:lvl5pPr>
-            <a:lvl6pPr eaLnBrk="1" hangingPunct="1">
-              <a:defRPr>
-                <a:solidFill>
-                  <a:schemeClr val="tx2"/>
-                </a:solidFill>
-              </a:defRPr>
-            </a:lvl6pPr>
-            <a:lvl7pPr eaLnBrk="1" hangingPunct="1">
-              <a:defRPr>
-                <a:solidFill>
-                  <a:schemeClr val="tx2"/>
-                </a:solidFill>
-              </a:defRPr>
-            </a:lvl7pPr>
-            <a:lvl8pPr eaLnBrk="1" hangingPunct="1">
-              <a:defRPr>
-                <a:solidFill>
-                  <a:schemeClr val="tx2"/>
-                </a:solidFill>
-              </a:defRPr>
-            </a:lvl8pPr>
-            <a:lvl9pPr eaLnBrk="1" hangingPunct="1">
-              <a:defRPr>
-                <a:solidFill>
-                  <a:schemeClr val="tx2"/>
-                </a:solidFill>
-              </a:defRPr>
-            </a:lvl9pPr>
-          </a:lstStyle>
-          <a:p>
-            <a:r>
-              <a:rPr lang="en-US" dirty="0"/>
-              <a:t>Project introduction</a:t>
-            </a:r>
-          </a:p>
-        </p:txBody>
-      </p:sp>
     </p:spTree>
     <p:extLst>
       <p:ext uri="{BB962C8B-B14F-4D97-AF65-F5344CB8AC3E}">
@@ -7932,7 +10719,7 @@
     </p:extLst>
   </p:cSld>
   <p:clrMapOvr>
-    <a:masterClrMapping/>
+    <a:overrideClrMapping bg1="lt1" tx1="dk1" bg2="lt2" tx2="dk2" accent1="accent1" accent2="accent2" accent3="accent3" accent4="accent4" accent5="accent5" accent6="accent6" hlink="hlink" folHlink="folHlink"/>
   </p:clrMapOvr>
 </p:sld>
 </file>
@@ -8076,7 +10863,113 @@
           <a:p>
             <a:r>
               <a:rPr lang="en-US" dirty="0"/>
-              <a:t>Project objectives</a:t>
+              <a:t>Project Summary</a:t>
+            </a:r>
+          </a:p>
+        </p:txBody>
+      </p:sp>
+      <p:sp>
+        <p:nvSpPr>
+          <p:cNvPr id="6" name="TextBox 5">
+            <a:extLst>
+              <a:ext uri="{FF2B5EF4-FFF2-40B4-BE49-F238E27FC236}">
+                <a16:creationId xmlns:a16="http://schemas.microsoft.com/office/drawing/2014/main" id="{FD079600-C61A-49C3-B6F5-651F4C6BE524}"/>
+              </a:ext>
+            </a:extLst>
+          </p:cNvPr>
+          <p:cNvSpPr txBox="1"/>
+          <p:nvPr/>
+        </p:nvSpPr>
+        <p:spPr>
+          <a:xfrm>
+            <a:off x="857250" y="1344930"/>
+            <a:ext cx="7429500" cy="2585323"/>
+          </a:xfrm>
+          <a:prstGeom prst="rect">
+            <a:avLst/>
+          </a:prstGeom>
+          <a:noFill/>
+        </p:spPr>
+        <p:txBody>
+          <a:bodyPr wrap="square" rtlCol="0">
+            <a:spAutoFit/>
+          </a:bodyPr>
+          <a:lstStyle/>
+          <a:p>
+            <a:r>
+              <a:rPr lang="en-US" u="sng" dirty="0"/>
+              <a:t>Industry:</a:t>
+            </a:r>
+          </a:p>
+          <a:p>
+            <a:pPr marL="742950" lvl="1" indent="-285750">
+              <a:buFont typeface="Arial" panose="020B0604020202020204" pitchFamily="34" charset="0"/>
+              <a:buChar char="•"/>
+            </a:pPr>
+            <a:r>
+              <a:rPr lang="en-US" dirty="0" err="1"/>
+              <a:t>PEO</a:t>
+            </a:r>
+            <a:r>
+              <a:rPr lang="en-US" dirty="0"/>
+              <a:t> - Professional Employer Organization</a:t>
+            </a:r>
+          </a:p>
+          <a:p>
+            <a:endParaRPr lang="en-US" dirty="0"/>
+          </a:p>
+          <a:p>
+            <a:r>
+              <a:rPr lang="en-US" u="sng" dirty="0"/>
+              <a:t>Definitions:</a:t>
+            </a:r>
+          </a:p>
+          <a:p>
+            <a:pPr marL="742950" lvl="1" indent="-285750">
+              <a:buFont typeface="Arial" panose="020B0604020202020204" pitchFamily="34" charset="0"/>
+              <a:buChar char="•"/>
+            </a:pPr>
+            <a:r>
+              <a:rPr lang="en-US" dirty="0" err="1"/>
+              <a:t>WSE</a:t>
+            </a:r>
+            <a:r>
+              <a:rPr lang="en-US" dirty="0"/>
+              <a:t> – Worksite Employee. Employees under the co-employment agreement that are supported by the payroll and human resources functions of the </a:t>
+            </a:r>
+            <a:r>
+              <a:rPr lang="en-US" dirty="0" err="1"/>
+              <a:t>PEO</a:t>
+            </a:r>
+            <a:r>
+              <a:rPr lang="en-US" dirty="0"/>
+              <a:t>.</a:t>
+            </a:r>
+          </a:p>
+          <a:p>
+            <a:pPr marL="742950" lvl="1" indent="-285750">
+              <a:buFont typeface="Arial" panose="020B0604020202020204" pitchFamily="34" charset="0"/>
+              <a:buChar char="•"/>
+            </a:pPr>
+            <a:r>
+              <a:rPr lang="en-US" dirty="0"/>
+              <a:t>Internal EE – Internal employees of the </a:t>
+            </a:r>
+            <a:r>
+              <a:rPr lang="en-US" dirty="0" err="1"/>
+              <a:t>PEO</a:t>
+            </a:r>
+            <a:r>
+              <a:rPr lang="en-US" dirty="0"/>
+              <a:t> that support clients and employees under </a:t>
+            </a:r>
+            <a:r>
+              <a:rPr lang="en-US"/>
+              <a:t>the co-employment </a:t>
+            </a:r>
+            <a:r>
+              <a:rPr lang="en-US" dirty="0"/>
+              <a:t>agreement.</a:t>
             </a:r>
           </a:p>
         </p:txBody>
@@ -8233,7 +11126,7 @@
           <a:p>
             <a:r>
               <a:rPr lang="en-US" dirty="0"/>
-              <a:t>Project development</a:t>
+              <a:t>Project Methods</a:t>
             </a:r>
           </a:p>
         </p:txBody>
@@ -8390,7 +11283,7 @@
           <a:p>
             <a:r>
               <a:rPr lang="en-US" dirty="0"/>
-              <a:t>Project development</a:t>
+              <a:t>Project results</a:t>
             </a:r>
           </a:p>
         </p:txBody>
@@ -8547,7 +11440,7 @@
           <a:p>
             <a:r>
               <a:rPr lang="en-US" dirty="0"/>
-              <a:t>Project development</a:t>
+              <a:t>Project results</a:t>
             </a:r>
           </a:p>
         </p:txBody>

</xml_diff>